<commit_message>
put TPCs into conceptual TAs figure
</commit_message>
<xml_diff>
--- a/figures/kd-figs/conceptual.pptx
+++ b/figures/kd-figs/conceptual.pptx
@@ -5,7 +5,7 @@
     <p:sldMasterId id="2147483648" r:id="rId1"/>
   </p:sldMasterIdLst>
   <p:notesMasterIdLst>
-    <p:notesMasterId r:id="rId9"/>
+    <p:notesMasterId r:id="rId11"/>
   </p:notesMasterIdLst>
   <p:sldIdLst>
     <p:sldId id="256" r:id="rId2"/>
@@ -13,8 +13,10 @@
     <p:sldId id="257" r:id="rId4"/>
     <p:sldId id="258" r:id="rId5"/>
     <p:sldId id="259" r:id="rId6"/>
-    <p:sldId id="261" r:id="rId7"/>
-    <p:sldId id="262" r:id="rId8"/>
+    <p:sldId id="263" r:id="rId7"/>
+    <p:sldId id="261" r:id="rId8"/>
+    <p:sldId id="264" r:id="rId9"/>
+    <p:sldId id="262" r:id="rId10"/>
   </p:sldIdLst>
   <p:sldSz cx="12192000" cy="6858000"/>
   <p:notesSz cx="6858000" cy="9144000"/>
@@ -203,7 +205,7 @@
           <a:p>
             <a:fld id="{5F0BAA97-B2B8-EA40-A7C9-10EAB2FFF9B3}" type="datetimeFigureOut">
               <a:rPr lang="en-US" smtClean="0"/>
-              <a:t>6/22/25</a:t>
+              <a:t>7/24/25</a:t>
             </a:fld>
             <a:endParaRPr lang="en-US"/>
           </a:p>
@@ -617,7 +619,7 @@
           <a:p>
             <a:fld id="{DF4DC901-9D7D-5040-9AC4-ED1AFACCCDE5}" type="datetimeFigureOut">
               <a:rPr lang="en-US" smtClean="0"/>
-              <a:t>6/22/25</a:t>
+              <a:t>7/24/25</a:t>
             </a:fld>
             <a:endParaRPr lang="en-US"/>
           </a:p>
@@ -815,7 +817,7 @@
           <a:p>
             <a:fld id="{DF4DC901-9D7D-5040-9AC4-ED1AFACCCDE5}" type="datetimeFigureOut">
               <a:rPr lang="en-US" smtClean="0"/>
-              <a:t>6/22/25</a:t>
+              <a:t>7/24/25</a:t>
             </a:fld>
             <a:endParaRPr lang="en-US"/>
           </a:p>
@@ -1023,7 +1025,7 @@
           <a:p>
             <a:fld id="{DF4DC901-9D7D-5040-9AC4-ED1AFACCCDE5}" type="datetimeFigureOut">
               <a:rPr lang="en-US" smtClean="0"/>
-              <a:t>6/22/25</a:t>
+              <a:t>7/24/25</a:t>
             </a:fld>
             <a:endParaRPr lang="en-US"/>
           </a:p>
@@ -1221,7 +1223,7 @@
           <a:p>
             <a:fld id="{DF4DC901-9D7D-5040-9AC4-ED1AFACCCDE5}" type="datetimeFigureOut">
               <a:rPr lang="en-US" smtClean="0"/>
-              <a:t>6/22/25</a:t>
+              <a:t>7/24/25</a:t>
             </a:fld>
             <a:endParaRPr lang="en-US"/>
           </a:p>
@@ -1496,7 +1498,7 @@
           <a:p>
             <a:fld id="{DF4DC901-9D7D-5040-9AC4-ED1AFACCCDE5}" type="datetimeFigureOut">
               <a:rPr lang="en-US" smtClean="0"/>
-              <a:t>6/22/25</a:t>
+              <a:t>7/24/25</a:t>
             </a:fld>
             <a:endParaRPr lang="en-US"/>
           </a:p>
@@ -1761,7 +1763,7 @@
           <a:p>
             <a:fld id="{DF4DC901-9D7D-5040-9AC4-ED1AFACCCDE5}" type="datetimeFigureOut">
               <a:rPr lang="en-US" smtClean="0"/>
-              <a:t>6/22/25</a:t>
+              <a:t>7/24/25</a:t>
             </a:fld>
             <a:endParaRPr lang="en-US"/>
           </a:p>
@@ -2173,7 +2175,7 @@
           <a:p>
             <a:fld id="{DF4DC901-9D7D-5040-9AC4-ED1AFACCCDE5}" type="datetimeFigureOut">
               <a:rPr lang="en-US" smtClean="0"/>
-              <a:t>6/22/25</a:t>
+              <a:t>7/24/25</a:t>
             </a:fld>
             <a:endParaRPr lang="en-US"/>
           </a:p>
@@ -2314,7 +2316,7 @@
           <a:p>
             <a:fld id="{DF4DC901-9D7D-5040-9AC4-ED1AFACCCDE5}" type="datetimeFigureOut">
               <a:rPr lang="en-US" smtClean="0"/>
-              <a:t>6/22/25</a:t>
+              <a:t>7/24/25</a:t>
             </a:fld>
             <a:endParaRPr lang="en-US"/>
           </a:p>
@@ -2427,7 +2429,7 @@
           <a:p>
             <a:fld id="{DF4DC901-9D7D-5040-9AC4-ED1AFACCCDE5}" type="datetimeFigureOut">
               <a:rPr lang="en-US" smtClean="0"/>
-              <a:t>6/22/25</a:t>
+              <a:t>7/24/25</a:t>
             </a:fld>
             <a:endParaRPr lang="en-US"/>
           </a:p>
@@ -2738,7 +2740,7 @@
           <a:p>
             <a:fld id="{DF4DC901-9D7D-5040-9AC4-ED1AFACCCDE5}" type="datetimeFigureOut">
               <a:rPr lang="en-US" smtClean="0"/>
-              <a:t>6/22/25</a:t>
+              <a:t>7/24/25</a:t>
             </a:fld>
             <a:endParaRPr lang="en-US"/>
           </a:p>
@@ -3026,7 +3028,7 @@
           <a:p>
             <a:fld id="{DF4DC901-9D7D-5040-9AC4-ED1AFACCCDE5}" type="datetimeFigureOut">
               <a:rPr lang="en-US" smtClean="0"/>
-              <a:t>6/22/25</a:t>
+              <a:t>7/24/25</a:t>
             </a:fld>
             <a:endParaRPr lang="en-US"/>
           </a:p>
@@ -3267,7 +3269,7 @@
           <a:p>
             <a:fld id="{DF4DC901-9D7D-5040-9AC4-ED1AFACCCDE5}" type="datetimeFigureOut">
               <a:rPr lang="en-US" smtClean="0"/>
-              <a:t>6/22/25</a:t>
+              <a:t>7/24/25</a:t>
             </a:fld>
             <a:endParaRPr lang="en-US"/>
           </a:p>
@@ -7275,43 +7277,6 @@
           </a:p>
         </p:txBody>
       </p:sp>
-      <p:sp>
-        <p:nvSpPr>
-          <p:cNvPr id="14" name="TextBox 13">
-            <a:extLst>
-              <a:ext uri="{FF2B5EF4-FFF2-40B4-BE49-F238E27FC236}">
-                <a16:creationId xmlns:a16="http://schemas.microsoft.com/office/drawing/2014/main" id="{44EC6C6F-7AEE-E912-504F-D48EB5065A1D}"/>
-              </a:ext>
-            </a:extLst>
-          </p:cNvPr>
-          <p:cNvSpPr txBox="1"/>
-          <p:nvPr/>
-        </p:nvSpPr>
-        <p:spPr>
-          <a:xfrm rot="16200000">
-            <a:off x="6165253" y="3043316"/>
-            <a:ext cx="1740726" cy="461665"/>
-          </a:xfrm>
-          <a:prstGeom prst="rect">
-            <a:avLst/>
-          </a:prstGeom>
-          <a:solidFill>
-            <a:schemeClr val="bg1"/>
-          </a:solidFill>
-        </p:spPr>
-        <p:txBody>
-          <a:bodyPr wrap="square" rtlCol="0">
-            <a:spAutoFit/>
-          </a:bodyPr>
-          <a:lstStyle/>
-          <a:p>
-            <a:r>
-              <a:rPr lang="en-US" sz="2400" dirty="0"/>
-              <a:t>Frequency</a:t>
-            </a:r>
-          </a:p>
-        </p:txBody>
-      </p:sp>
       <p:pic>
         <p:nvPicPr>
           <p:cNvPr id="15" name="Picture 14">
@@ -7394,6 +7359,500 @@
 </file>
 
 <file path=ppt/slides/slide6.xml><?xml version="1.0" encoding="utf-8"?>
+<p:sld xmlns:a="http://schemas.openxmlformats.org/drawingml/2006/main" xmlns:r="http://schemas.openxmlformats.org/officeDocument/2006/relationships" xmlns:p="http://schemas.openxmlformats.org/presentationml/2006/main">
+  <p:cSld>
+    <p:spTree>
+      <p:nvGrpSpPr>
+        <p:cNvPr id="1" name=""/>
+        <p:cNvGrpSpPr/>
+        <p:nvPr/>
+      </p:nvGrpSpPr>
+      <p:grpSpPr>
+        <a:xfrm>
+          <a:off x="0" y="0"/>
+          <a:ext cx="0" cy="0"/>
+          <a:chOff x="0" y="0"/>
+          <a:chExt cx="0" cy="0"/>
+        </a:xfrm>
+      </p:grpSpPr>
+      <p:pic>
+        <p:nvPicPr>
+          <p:cNvPr id="5" name="Picture 4" descr="A diagram of a heat wave&#10;&#10;AI-generated content may be incorrect.">
+            <a:extLst>
+              <a:ext uri="{FF2B5EF4-FFF2-40B4-BE49-F238E27FC236}">
+                <a16:creationId xmlns:a16="http://schemas.microsoft.com/office/drawing/2014/main" id="{6ED4D34A-611B-72CB-161F-91EF2390155A}"/>
+              </a:ext>
+            </a:extLst>
+          </p:cNvPr>
+          <p:cNvPicPr>
+            <a:picLocks noChangeAspect="1"/>
+          </p:cNvPicPr>
+          <p:nvPr/>
+        </p:nvPicPr>
+        <p:blipFill>
+          <a:blip r:embed="rId2"/>
+          <a:srcRect t="12251" r="47227"/>
+          <a:stretch/>
+        </p:blipFill>
+        <p:spPr>
+          <a:xfrm>
+            <a:off x="139337" y="1733006"/>
+            <a:ext cx="4101738" cy="3680270"/>
+          </a:xfrm>
+          <a:prstGeom prst="rect">
+            <a:avLst/>
+          </a:prstGeom>
+        </p:spPr>
+      </p:pic>
+      <p:pic>
+        <p:nvPicPr>
+          <p:cNvPr id="7" name="Picture 6" descr="A diagram of a heat wave&#10;&#10;AI-generated content may be incorrect.">
+            <a:extLst>
+              <a:ext uri="{FF2B5EF4-FFF2-40B4-BE49-F238E27FC236}">
+                <a16:creationId xmlns:a16="http://schemas.microsoft.com/office/drawing/2014/main" id="{CED3F076-3485-CDA6-A01C-AC24DBCA60AA}"/>
+              </a:ext>
+            </a:extLst>
+          </p:cNvPr>
+          <p:cNvPicPr>
+            <a:picLocks noChangeAspect="1"/>
+          </p:cNvPicPr>
+          <p:nvPr/>
+        </p:nvPicPr>
+        <p:blipFill>
+          <a:blip r:embed="rId2"/>
+          <a:srcRect l="54396" t="12251" r="338"/>
+          <a:stretch/>
+        </p:blipFill>
+        <p:spPr>
+          <a:xfrm>
+            <a:off x="8590204" y="1675167"/>
+            <a:ext cx="3518262" cy="3680270"/>
+          </a:xfrm>
+          <a:prstGeom prst="rect">
+            <a:avLst/>
+          </a:prstGeom>
+        </p:spPr>
+      </p:pic>
+      <p:pic>
+        <p:nvPicPr>
+          <p:cNvPr id="11" name="Picture 10">
+            <a:extLst>
+              <a:ext uri="{FF2B5EF4-FFF2-40B4-BE49-F238E27FC236}">
+                <a16:creationId xmlns:a16="http://schemas.microsoft.com/office/drawing/2014/main" id="{3ADBCA53-67CD-9ADB-5183-C3A7E750FF33}"/>
+              </a:ext>
+            </a:extLst>
+          </p:cNvPr>
+          <p:cNvPicPr>
+            <a:picLocks noChangeAspect="1"/>
+          </p:cNvPicPr>
+          <p:nvPr/>
+        </p:nvPicPr>
+        <p:blipFill>
+          <a:blip r:embed="rId3"/>
+          <a:srcRect/>
+          <a:stretch/>
+        </p:blipFill>
+        <p:spPr>
+          <a:xfrm>
+            <a:off x="4712425" y="1733006"/>
+            <a:ext cx="3166256" cy="3166256"/>
+          </a:xfrm>
+          <a:prstGeom prst="rect">
+            <a:avLst/>
+          </a:prstGeom>
+        </p:spPr>
+      </p:pic>
+      <p:pic>
+        <p:nvPicPr>
+          <p:cNvPr id="13" name="Picture 12" descr="A black text on a white background&#10;&#10;AI-generated content may be incorrect.">
+            <a:extLst>
+              <a:ext uri="{FF2B5EF4-FFF2-40B4-BE49-F238E27FC236}">
+                <a16:creationId xmlns:a16="http://schemas.microsoft.com/office/drawing/2014/main" id="{E5EE94BF-DAF6-A276-689F-88D7F28C001D}"/>
+              </a:ext>
+            </a:extLst>
+          </p:cNvPr>
+          <p:cNvPicPr>
+            <a:picLocks noChangeAspect="1"/>
+          </p:cNvPicPr>
+          <p:nvPr/>
+        </p:nvPicPr>
+        <p:blipFill>
+          <a:blip r:embed="rId4"/>
+          <a:stretch>
+            <a:fillRect/>
+          </a:stretch>
+        </p:blipFill>
+        <p:spPr>
+          <a:xfrm>
+            <a:off x="5496886" y="4635275"/>
+            <a:ext cx="1837507" cy="381559"/>
+          </a:xfrm>
+          <a:prstGeom prst="rect">
+            <a:avLst/>
+          </a:prstGeom>
+        </p:spPr>
+      </p:pic>
+      <p:pic>
+        <p:nvPicPr>
+          <p:cNvPr id="15" name="Picture 14" descr="A black text on a white background&#10;&#10;AI-generated content may be incorrect.">
+            <a:extLst>
+              <a:ext uri="{FF2B5EF4-FFF2-40B4-BE49-F238E27FC236}">
+                <a16:creationId xmlns:a16="http://schemas.microsoft.com/office/drawing/2014/main" id="{1475C84A-4483-F0FB-EEBE-3F06B4820E4C}"/>
+              </a:ext>
+            </a:extLst>
+          </p:cNvPr>
+          <p:cNvPicPr>
+            <a:picLocks noChangeAspect="1"/>
+          </p:cNvPicPr>
+          <p:nvPr/>
+        </p:nvPicPr>
+        <p:blipFill>
+          <a:blip r:embed="rId5"/>
+          <a:stretch>
+            <a:fillRect/>
+          </a:stretch>
+        </p:blipFill>
+        <p:spPr>
+          <a:xfrm>
+            <a:off x="4528056" y="2701608"/>
+            <a:ext cx="457201" cy="1016001"/>
+          </a:xfrm>
+          <a:prstGeom prst="rect">
+            <a:avLst/>
+          </a:prstGeom>
+        </p:spPr>
+      </p:pic>
+      <p:sp>
+        <p:nvSpPr>
+          <p:cNvPr id="16" name="TextBox 15">
+            <a:extLst>
+              <a:ext uri="{FF2B5EF4-FFF2-40B4-BE49-F238E27FC236}">
+                <a16:creationId xmlns:a16="http://schemas.microsoft.com/office/drawing/2014/main" id="{ADD7EB3C-30AA-052B-8D79-7E4324AC4B58}"/>
+              </a:ext>
+            </a:extLst>
+          </p:cNvPr>
+          <p:cNvSpPr txBox="1"/>
+          <p:nvPr/>
+        </p:nvSpPr>
+        <p:spPr>
+          <a:xfrm>
+            <a:off x="5173540" y="4008511"/>
+            <a:ext cx="1080248" cy="307777"/>
+          </a:xfrm>
+          <a:prstGeom prst="rect">
+            <a:avLst/>
+          </a:prstGeom>
+          <a:noFill/>
+        </p:spPr>
+        <p:txBody>
+          <a:bodyPr wrap="square" rtlCol="0">
+            <a:spAutoFit/>
+          </a:bodyPr>
+          <a:lstStyle/>
+          <a:p>
+            <a:r>
+              <a:rPr lang="en-US" sz="1400" dirty="0"/>
+              <a:t>c</a:t>
+            </a:r>
+            <a:r>
+              <a:rPr lang="en-US" sz="1400" baseline="-25000" dirty="0"/>
+              <a:t>2b</a:t>
+            </a:r>
+            <a:endParaRPr lang="en-US" sz="1400" dirty="0"/>
+          </a:p>
+        </p:txBody>
+      </p:sp>
+      <p:sp>
+        <p:nvSpPr>
+          <p:cNvPr id="17" name="TextBox 16">
+            <a:extLst>
+              <a:ext uri="{FF2B5EF4-FFF2-40B4-BE49-F238E27FC236}">
+                <a16:creationId xmlns:a16="http://schemas.microsoft.com/office/drawing/2014/main" id="{512BD40C-E598-2F2E-0F31-299B16A1ED8A}"/>
+              </a:ext>
+            </a:extLst>
+          </p:cNvPr>
+          <p:cNvSpPr txBox="1"/>
+          <p:nvPr/>
+        </p:nvSpPr>
+        <p:spPr>
+          <a:xfrm>
+            <a:off x="5052748" y="3684192"/>
+            <a:ext cx="588229" cy="307777"/>
+          </a:xfrm>
+          <a:prstGeom prst="rect">
+            <a:avLst/>
+          </a:prstGeom>
+          <a:noFill/>
+        </p:spPr>
+        <p:txBody>
+          <a:bodyPr wrap="square" rtlCol="0">
+            <a:spAutoFit/>
+          </a:bodyPr>
+          <a:lstStyle/>
+          <a:p>
+            <a:r>
+              <a:rPr lang="en-US" sz="1400" dirty="0"/>
+              <a:t>r</a:t>
+            </a:r>
+            <a:r>
+              <a:rPr lang="en-US" sz="1400" baseline="-25000" dirty="0"/>
+              <a:t>b</a:t>
+            </a:r>
+          </a:p>
+        </p:txBody>
+      </p:sp>
+      <p:sp>
+        <p:nvSpPr>
+          <p:cNvPr id="18" name="TextBox 17">
+            <a:extLst>
+              <a:ext uri="{FF2B5EF4-FFF2-40B4-BE49-F238E27FC236}">
+                <a16:creationId xmlns:a16="http://schemas.microsoft.com/office/drawing/2014/main" id="{A9187987-FE3A-2C47-3302-ABB2AAEEBCB7}"/>
+              </a:ext>
+            </a:extLst>
+          </p:cNvPr>
+          <p:cNvSpPr txBox="1"/>
+          <p:nvPr/>
+        </p:nvSpPr>
+        <p:spPr>
+          <a:xfrm>
+            <a:off x="10877006" y="4617857"/>
+            <a:ext cx="287382" cy="261610"/>
+          </a:xfrm>
+          <a:prstGeom prst="rect">
+            <a:avLst/>
+          </a:prstGeom>
+          <a:noFill/>
+        </p:spPr>
+        <p:txBody>
+          <a:bodyPr wrap="square" rtlCol="0">
+            <a:spAutoFit/>
+          </a:bodyPr>
+          <a:lstStyle/>
+          <a:p>
+            <a:r>
+              <a:rPr lang="en-US" sz="1100" dirty="0"/>
+              <a:t>b</a:t>
+            </a:r>
+          </a:p>
+        </p:txBody>
+      </p:sp>
+      <p:cxnSp>
+        <p:nvCxnSpPr>
+          <p:cNvPr id="20" name="Straight Arrow Connector 19">
+            <a:extLst>
+              <a:ext uri="{FF2B5EF4-FFF2-40B4-BE49-F238E27FC236}">
+                <a16:creationId xmlns:a16="http://schemas.microsoft.com/office/drawing/2014/main" id="{7FA8666D-DDAF-92A9-0267-23EDB294AD8F}"/>
+              </a:ext>
+            </a:extLst>
+          </p:cNvPr>
+          <p:cNvCxnSpPr>
+            <a:cxnSpLocks/>
+          </p:cNvCxnSpPr>
+          <p:nvPr/>
+        </p:nvCxnSpPr>
+        <p:spPr>
+          <a:xfrm flipV="1">
+            <a:off x="5640977" y="3408119"/>
+            <a:ext cx="475951" cy="434879"/>
+          </a:xfrm>
+          <a:prstGeom prst="straightConnector1">
+            <a:avLst/>
+          </a:prstGeom>
+          <a:ln>
+            <a:solidFill>
+              <a:srgbClr val="DAA620"/>
+            </a:solidFill>
+            <a:tailEnd type="triangle"/>
+          </a:ln>
+        </p:spPr>
+        <p:style>
+          <a:lnRef idx="2">
+            <a:schemeClr val="accent1"/>
+          </a:lnRef>
+          <a:fillRef idx="0">
+            <a:schemeClr val="accent1"/>
+          </a:fillRef>
+          <a:effectRef idx="1">
+            <a:schemeClr val="accent1"/>
+          </a:effectRef>
+          <a:fontRef idx="minor">
+            <a:schemeClr val="tx1"/>
+          </a:fontRef>
+        </p:style>
+      </p:cxnSp>
+      <p:cxnSp>
+        <p:nvCxnSpPr>
+          <p:cNvPr id="21" name="Straight Arrow Connector 20">
+            <a:extLst>
+              <a:ext uri="{FF2B5EF4-FFF2-40B4-BE49-F238E27FC236}">
+                <a16:creationId xmlns:a16="http://schemas.microsoft.com/office/drawing/2014/main" id="{5C9C2D51-705E-52F5-7BAC-94494CF1C70B}"/>
+              </a:ext>
+            </a:extLst>
+          </p:cNvPr>
+          <p:cNvCxnSpPr>
+            <a:cxnSpLocks/>
+          </p:cNvCxnSpPr>
+          <p:nvPr/>
+        </p:nvCxnSpPr>
+        <p:spPr>
+          <a:xfrm flipV="1">
+            <a:off x="5390281" y="3223815"/>
+            <a:ext cx="544189" cy="291487"/>
+          </a:xfrm>
+          <a:prstGeom prst="straightConnector1">
+            <a:avLst/>
+          </a:prstGeom>
+          <a:ln>
+            <a:solidFill>
+              <a:srgbClr val="1D86EE"/>
+            </a:solidFill>
+            <a:tailEnd type="triangle"/>
+          </a:ln>
+        </p:spPr>
+        <p:style>
+          <a:lnRef idx="2">
+            <a:schemeClr val="accent1"/>
+          </a:lnRef>
+          <a:fillRef idx="0">
+            <a:schemeClr val="accent1"/>
+          </a:fillRef>
+          <a:effectRef idx="1">
+            <a:schemeClr val="accent1"/>
+          </a:effectRef>
+          <a:fontRef idx="minor">
+            <a:schemeClr val="tx1"/>
+          </a:fontRef>
+        </p:style>
+      </p:cxnSp>
+      <p:sp>
+        <p:nvSpPr>
+          <p:cNvPr id="24" name="TextBox 23">
+            <a:extLst>
+              <a:ext uri="{FF2B5EF4-FFF2-40B4-BE49-F238E27FC236}">
+                <a16:creationId xmlns:a16="http://schemas.microsoft.com/office/drawing/2014/main" id="{8B58CC43-1310-7F78-A97E-522368F0A44D}"/>
+              </a:ext>
+            </a:extLst>
+          </p:cNvPr>
+          <p:cNvSpPr txBox="1"/>
+          <p:nvPr/>
+        </p:nvSpPr>
+        <p:spPr>
+          <a:xfrm>
+            <a:off x="5424195" y="3120513"/>
+            <a:ext cx="588229" cy="276999"/>
+          </a:xfrm>
+          <a:prstGeom prst="rect">
+            <a:avLst/>
+          </a:prstGeom>
+          <a:noFill/>
+        </p:spPr>
+        <p:txBody>
+          <a:bodyPr wrap="square" rtlCol="0">
+            <a:spAutoFit/>
+          </a:bodyPr>
+          <a:lstStyle/>
+          <a:p>
+            <a:r>
+              <a:rPr lang="en-US" sz="1200" dirty="0"/>
+              <a:t>E</a:t>
+            </a:r>
+            <a:r>
+              <a:rPr lang="en-US" sz="1200" baseline="-25000" dirty="0"/>
+              <a:t>rb</a:t>
+            </a:r>
+            <a:endParaRPr lang="en-US" sz="1200" dirty="0"/>
+          </a:p>
+        </p:txBody>
+      </p:sp>
+      <p:sp>
+        <p:nvSpPr>
+          <p:cNvPr id="25" name="TextBox 24">
+            <a:extLst>
+              <a:ext uri="{FF2B5EF4-FFF2-40B4-BE49-F238E27FC236}">
+                <a16:creationId xmlns:a16="http://schemas.microsoft.com/office/drawing/2014/main" id="{48F5BC3B-D7B3-7C57-C47E-C5E27AD97E35}"/>
+              </a:ext>
+            </a:extLst>
+          </p:cNvPr>
+          <p:cNvSpPr txBox="1"/>
+          <p:nvPr/>
+        </p:nvSpPr>
+        <p:spPr>
+          <a:xfrm>
+            <a:off x="5799508" y="3570440"/>
+            <a:ext cx="588229" cy="276999"/>
+          </a:xfrm>
+          <a:prstGeom prst="rect">
+            <a:avLst/>
+          </a:prstGeom>
+          <a:noFill/>
+        </p:spPr>
+        <p:txBody>
+          <a:bodyPr wrap="square" rtlCol="0">
+            <a:spAutoFit/>
+          </a:bodyPr>
+          <a:lstStyle/>
+          <a:p>
+            <a:r>
+              <a:rPr lang="en-US" sz="1200" dirty="0"/>
+              <a:t>E</a:t>
+            </a:r>
+            <a:r>
+              <a:rPr lang="en-US" sz="1200" baseline="-25000" dirty="0"/>
+              <a:t>c2b</a:t>
+            </a:r>
+            <a:endParaRPr lang="en-US" sz="1200" dirty="0"/>
+          </a:p>
+        </p:txBody>
+      </p:sp>
+      <p:sp>
+        <p:nvSpPr>
+          <p:cNvPr id="26" name="TextBox 25">
+            <a:extLst>
+              <a:ext uri="{FF2B5EF4-FFF2-40B4-BE49-F238E27FC236}">
+                <a16:creationId xmlns:a16="http://schemas.microsoft.com/office/drawing/2014/main" id="{D54D1E12-0A81-571A-0608-C52A43B3ED76}"/>
+              </a:ext>
+            </a:extLst>
+          </p:cNvPr>
+          <p:cNvSpPr txBox="1"/>
+          <p:nvPr/>
+        </p:nvSpPr>
+        <p:spPr>
+          <a:xfrm>
+            <a:off x="3275084" y="495827"/>
+            <a:ext cx="4714369" cy="461665"/>
+          </a:xfrm>
+          <a:prstGeom prst="rect">
+            <a:avLst/>
+          </a:prstGeom>
+          <a:noFill/>
+        </p:spPr>
+        <p:txBody>
+          <a:bodyPr wrap="square" rtlCol="0">
+            <a:spAutoFit/>
+          </a:bodyPr>
+          <a:lstStyle/>
+          <a:p>
+            <a:r>
+              <a:rPr lang="en-US" sz="2400" dirty="0"/>
+              <a:t>Inter-process thermal asymmetry</a:t>
+            </a:r>
+          </a:p>
+        </p:txBody>
+      </p:sp>
+    </p:spTree>
+    <p:extLst>
+      <p:ext uri="{BB962C8B-B14F-4D97-AF65-F5344CB8AC3E}">
+        <p14:creationId xmlns:p14="http://schemas.microsoft.com/office/powerpoint/2010/main" val="3965078389"/>
+      </p:ext>
+    </p:extLst>
+  </p:cSld>
+  <p:clrMapOvr>
+    <a:masterClrMapping/>
+  </p:clrMapOvr>
+</p:sld>
+</file>
+
+<file path=ppt/slides/slide7.xml><?xml version="1.0" encoding="utf-8"?>
 <p:sld xmlns:a="http://schemas.openxmlformats.org/drawingml/2006/main" xmlns:r="http://schemas.openxmlformats.org/officeDocument/2006/relationships" xmlns:p="http://schemas.openxmlformats.org/presentationml/2006/main">
   <p:cSld>
     <p:spTree>
@@ -8759,7 +9218,546 @@
 </p:sld>
 </file>
 
-<file path=ppt/slides/slide7.xml><?xml version="1.0" encoding="utf-8"?>
+<file path=ppt/slides/slide8.xml><?xml version="1.0" encoding="utf-8"?>
+<p:sld xmlns:a="http://schemas.openxmlformats.org/drawingml/2006/main" xmlns:r="http://schemas.openxmlformats.org/officeDocument/2006/relationships" xmlns:p="http://schemas.openxmlformats.org/presentationml/2006/main">
+  <p:cSld>
+    <p:spTree>
+      <p:nvGrpSpPr>
+        <p:cNvPr id="1" name=""/>
+        <p:cNvGrpSpPr/>
+        <p:nvPr/>
+      </p:nvGrpSpPr>
+      <p:grpSpPr>
+        <a:xfrm>
+          <a:off x="0" y="0"/>
+          <a:ext cx="0" cy="0"/>
+          <a:chOff x="0" y="0"/>
+          <a:chExt cx="0" cy="0"/>
+        </a:xfrm>
+      </p:grpSpPr>
+      <p:pic>
+        <p:nvPicPr>
+          <p:cNvPr id="5" name="Picture 4" descr="A diagram of a heat exchanger&#10;&#10;AI-generated content may be incorrect.">
+            <a:extLst>
+              <a:ext uri="{FF2B5EF4-FFF2-40B4-BE49-F238E27FC236}">
+                <a16:creationId xmlns:a16="http://schemas.microsoft.com/office/drawing/2014/main" id="{9F42E330-4C9C-5FF7-86F1-1FFE0DCAE1DF}"/>
+              </a:ext>
+            </a:extLst>
+          </p:cNvPr>
+          <p:cNvPicPr>
+            <a:picLocks noChangeAspect="1"/>
+          </p:cNvPicPr>
+          <p:nvPr/>
+        </p:nvPicPr>
+        <p:blipFill>
+          <a:blip r:embed="rId2"/>
+          <a:srcRect t="13882" r="47339"/>
+          <a:stretch/>
+        </p:blipFill>
+        <p:spPr>
+          <a:xfrm>
+            <a:off x="0" y="1811379"/>
+            <a:ext cx="4093028" cy="3529102"/>
+          </a:xfrm>
+          <a:prstGeom prst="rect">
+            <a:avLst/>
+          </a:prstGeom>
+        </p:spPr>
+      </p:pic>
+      <p:pic>
+        <p:nvPicPr>
+          <p:cNvPr id="6" name="Picture 5" descr="A diagram of a heat exchanger&#10;&#10;AI-generated content may be incorrect.">
+            <a:extLst>
+              <a:ext uri="{FF2B5EF4-FFF2-40B4-BE49-F238E27FC236}">
+                <a16:creationId xmlns:a16="http://schemas.microsoft.com/office/drawing/2014/main" id="{58DF6D50-0003-9D90-89CD-A7A95C592D66}"/>
+              </a:ext>
+            </a:extLst>
+          </p:cNvPr>
+          <p:cNvPicPr>
+            <a:picLocks noChangeAspect="1"/>
+          </p:cNvPicPr>
+          <p:nvPr/>
+        </p:nvPicPr>
+        <p:blipFill>
+          <a:blip r:embed="rId2"/>
+          <a:srcRect l="53500" t="13882" r="3699"/>
+          <a:stretch/>
+        </p:blipFill>
+        <p:spPr>
+          <a:xfrm>
+            <a:off x="8569235" y="1664449"/>
+            <a:ext cx="3326673" cy="3529102"/>
+          </a:xfrm>
+          <a:prstGeom prst="rect">
+            <a:avLst/>
+          </a:prstGeom>
+        </p:spPr>
+      </p:pic>
+      <p:sp>
+        <p:nvSpPr>
+          <p:cNvPr id="7" name="TextBox 6">
+            <a:extLst>
+              <a:ext uri="{FF2B5EF4-FFF2-40B4-BE49-F238E27FC236}">
+                <a16:creationId xmlns:a16="http://schemas.microsoft.com/office/drawing/2014/main" id="{4F2FEA2F-D331-4DDD-9F3C-D7F39F3D33E2}"/>
+              </a:ext>
+            </a:extLst>
+          </p:cNvPr>
+          <p:cNvSpPr txBox="1"/>
+          <p:nvPr/>
+        </p:nvSpPr>
+        <p:spPr>
+          <a:xfrm>
+            <a:off x="3275084" y="495827"/>
+            <a:ext cx="4714369" cy="461665"/>
+          </a:xfrm>
+          <a:prstGeom prst="rect">
+            <a:avLst/>
+          </a:prstGeom>
+          <a:noFill/>
+        </p:spPr>
+        <p:txBody>
+          <a:bodyPr wrap="square" rtlCol="0">
+            <a:spAutoFit/>
+          </a:bodyPr>
+          <a:lstStyle/>
+          <a:p>
+            <a:r>
+              <a:rPr lang="en-US" sz="2400" dirty="0"/>
+              <a:t>Intra-process thermal asymmetry</a:t>
+            </a:r>
+          </a:p>
+        </p:txBody>
+      </p:sp>
+      <p:pic>
+        <p:nvPicPr>
+          <p:cNvPr id="9" name="Picture 8" descr="A blue lines on a black background&#10;&#10;AI-generated content may be incorrect.">
+            <a:extLst>
+              <a:ext uri="{FF2B5EF4-FFF2-40B4-BE49-F238E27FC236}">
+                <a16:creationId xmlns:a16="http://schemas.microsoft.com/office/drawing/2014/main" id="{9B1CBAB2-8000-6026-E623-397D34194199}"/>
+              </a:ext>
+            </a:extLst>
+          </p:cNvPr>
+          <p:cNvPicPr>
+            <a:picLocks noChangeAspect="1"/>
+          </p:cNvPicPr>
+          <p:nvPr/>
+        </p:nvPicPr>
+        <p:blipFill>
+          <a:blip r:embed="rId3"/>
+          <a:stretch>
+            <a:fillRect/>
+          </a:stretch>
+        </p:blipFill>
+        <p:spPr>
+          <a:xfrm>
+            <a:off x="4815858" y="1734118"/>
+            <a:ext cx="3152485" cy="3039180"/>
+          </a:xfrm>
+          <a:prstGeom prst="rect">
+            <a:avLst/>
+          </a:prstGeom>
+        </p:spPr>
+      </p:pic>
+      <p:pic>
+        <p:nvPicPr>
+          <p:cNvPr id="10" name="Picture 9" descr="A black text on a white background&#10;&#10;AI-generated content may be incorrect.">
+            <a:extLst>
+              <a:ext uri="{FF2B5EF4-FFF2-40B4-BE49-F238E27FC236}">
+                <a16:creationId xmlns:a16="http://schemas.microsoft.com/office/drawing/2014/main" id="{E2EBAB9A-D4FC-0920-24BD-F9303FDA029E}"/>
+              </a:ext>
+            </a:extLst>
+          </p:cNvPr>
+          <p:cNvPicPr>
+            <a:picLocks noChangeAspect="1"/>
+          </p:cNvPicPr>
+          <p:nvPr/>
+        </p:nvPicPr>
+        <p:blipFill>
+          <a:blip r:embed="rId4"/>
+          <a:stretch>
+            <a:fillRect/>
+          </a:stretch>
+        </p:blipFill>
+        <p:spPr>
+          <a:xfrm>
+            <a:off x="5632268" y="4495938"/>
+            <a:ext cx="1837507" cy="381559"/>
+          </a:xfrm>
+          <a:prstGeom prst="rect">
+            <a:avLst/>
+          </a:prstGeom>
+        </p:spPr>
+      </p:pic>
+      <p:pic>
+        <p:nvPicPr>
+          <p:cNvPr id="11" name="Picture 10" descr="A black text on a white background&#10;&#10;AI-generated content may be incorrect.">
+            <a:extLst>
+              <a:ext uri="{FF2B5EF4-FFF2-40B4-BE49-F238E27FC236}">
+                <a16:creationId xmlns:a16="http://schemas.microsoft.com/office/drawing/2014/main" id="{FD02FED3-3C58-38B1-8351-EDF409388ED2}"/>
+              </a:ext>
+            </a:extLst>
+          </p:cNvPr>
+          <p:cNvPicPr>
+            <a:picLocks noChangeAspect="1"/>
+          </p:cNvPicPr>
+          <p:nvPr/>
+        </p:nvPicPr>
+        <p:blipFill>
+          <a:blip r:embed="rId5"/>
+          <a:stretch>
+            <a:fillRect/>
+          </a:stretch>
+        </p:blipFill>
+        <p:spPr>
+          <a:xfrm>
+            <a:off x="4634047" y="2640648"/>
+            <a:ext cx="457201" cy="1016001"/>
+          </a:xfrm>
+          <a:prstGeom prst="rect">
+            <a:avLst/>
+          </a:prstGeom>
+        </p:spPr>
+      </p:pic>
+      <p:pic>
+        <p:nvPicPr>
+          <p:cNvPr id="12" name="Graphic 11" descr="Line arrow: Rotate right with solid fill">
+            <a:extLst>
+              <a:ext uri="{FF2B5EF4-FFF2-40B4-BE49-F238E27FC236}">
+                <a16:creationId xmlns:a16="http://schemas.microsoft.com/office/drawing/2014/main" id="{8A94A8C7-F14F-5BAF-DE56-ED005FBDF70C}"/>
+              </a:ext>
+            </a:extLst>
+          </p:cNvPr>
+          <p:cNvPicPr>
+            <a:picLocks noChangeAspect="1"/>
+          </p:cNvPicPr>
+          <p:nvPr/>
+        </p:nvPicPr>
+        <p:blipFill>
+          <a:blip r:embed="rId6">
+            <a:extLst>
+              <a:ext uri="{96DAC541-7B7A-43D3-8B79-37D633B846F1}">
+                <asvg:svgBlip xmlns:asvg="http://schemas.microsoft.com/office/drawing/2016/SVG/main" r:embed="rId7"/>
+              </a:ext>
+            </a:extLst>
+          </a:blip>
+          <a:stretch>
+            <a:fillRect/>
+          </a:stretch>
+        </p:blipFill>
+        <p:spPr>
+          <a:xfrm rot="13588340">
+            <a:off x="854768" y="3924285"/>
+            <a:ext cx="617464" cy="617464"/>
+          </a:xfrm>
+          <a:prstGeom prst="rect">
+            <a:avLst/>
+          </a:prstGeom>
+        </p:spPr>
+      </p:pic>
+      <p:cxnSp>
+        <p:nvCxnSpPr>
+          <p:cNvPr id="14" name="Straight Connector 13">
+            <a:extLst>
+              <a:ext uri="{FF2B5EF4-FFF2-40B4-BE49-F238E27FC236}">
+                <a16:creationId xmlns:a16="http://schemas.microsoft.com/office/drawing/2014/main" id="{B6DA933F-DB8C-69FE-5997-826F7156809B}"/>
+              </a:ext>
+            </a:extLst>
+          </p:cNvPr>
+          <p:cNvCxnSpPr/>
+          <p:nvPr/>
+        </p:nvCxnSpPr>
+        <p:spPr>
+          <a:xfrm>
+            <a:off x="9875520" y="3656649"/>
+            <a:ext cx="0" cy="767305"/>
+          </a:xfrm>
+          <a:prstGeom prst="line">
+            <a:avLst/>
+          </a:prstGeom>
+          <a:ln>
+            <a:solidFill>
+              <a:srgbClr val="003D88"/>
+            </a:solidFill>
+            <a:prstDash val="lgDash"/>
+          </a:ln>
+        </p:spPr>
+        <p:style>
+          <a:lnRef idx="2">
+            <a:schemeClr val="accent1"/>
+          </a:lnRef>
+          <a:fillRef idx="0">
+            <a:schemeClr val="accent1"/>
+          </a:fillRef>
+          <a:effectRef idx="1">
+            <a:schemeClr val="accent1"/>
+          </a:effectRef>
+          <a:fontRef idx="minor">
+            <a:schemeClr val="tx1"/>
+          </a:fontRef>
+        </p:style>
+      </p:cxnSp>
+      <p:sp>
+        <p:nvSpPr>
+          <p:cNvPr id="15" name="TextBox 14">
+            <a:extLst>
+              <a:ext uri="{FF2B5EF4-FFF2-40B4-BE49-F238E27FC236}">
+                <a16:creationId xmlns:a16="http://schemas.microsoft.com/office/drawing/2014/main" id="{1599232C-7A1F-1F48-9E21-76F0536605E3}"/>
+              </a:ext>
+            </a:extLst>
+          </p:cNvPr>
+          <p:cNvSpPr txBox="1"/>
+          <p:nvPr/>
+        </p:nvSpPr>
+        <p:spPr>
+          <a:xfrm>
+            <a:off x="5115742" y="3003468"/>
+            <a:ext cx="415833" cy="307777"/>
+          </a:xfrm>
+          <a:prstGeom prst="rect">
+            <a:avLst/>
+          </a:prstGeom>
+          <a:noFill/>
+        </p:spPr>
+        <p:txBody>
+          <a:bodyPr wrap="square" rtlCol="0">
+            <a:spAutoFit/>
+          </a:bodyPr>
+          <a:lstStyle/>
+          <a:p>
+            <a:r>
+              <a:rPr lang="en-US" sz="1400" dirty="0"/>
+              <a:t>r</a:t>
+            </a:r>
+            <a:r>
+              <a:rPr lang="en-US" sz="1400" baseline="-25000" dirty="0"/>
+              <a:t>a</a:t>
+            </a:r>
+            <a:endParaRPr lang="en-US" sz="1400" dirty="0"/>
+          </a:p>
+        </p:txBody>
+      </p:sp>
+      <p:sp>
+        <p:nvSpPr>
+          <p:cNvPr id="16" name="TextBox 15">
+            <a:extLst>
+              <a:ext uri="{FF2B5EF4-FFF2-40B4-BE49-F238E27FC236}">
+                <a16:creationId xmlns:a16="http://schemas.microsoft.com/office/drawing/2014/main" id="{44FDFD56-88C1-C84C-D01F-B85EA5FD2B15}"/>
+              </a:ext>
+            </a:extLst>
+          </p:cNvPr>
+          <p:cNvSpPr txBox="1"/>
+          <p:nvPr/>
+        </p:nvSpPr>
+        <p:spPr>
+          <a:xfrm>
+            <a:off x="5131641" y="3541094"/>
+            <a:ext cx="415833" cy="307777"/>
+          </a:xfrm>
+          <a:prstGeom prst="rect">
+            <a:avLst/>
+          </a:prstGeom>
+          <a:noFill/>
+        </p:spPr>
+        <p:txBody>
+          <a:bodyPr wrap="square" rtlCol="0">
+            <a:spAutoFit/>
+          </a:bodyPr>
+          <a:lstStyle/>
+          <a:p>
+            <a:r>
+              <a:rPr lang="en-US" sz="1400" dirty="0"/>
+              <a:t>r</a:t>
+            </a:r>
+            <a:r>
+              <a:rPr lang="en-US" sz="1400" baseline="-25000" dirty="0"/>
+              <a:t>b</a:t>
+            </a:r>
+            <a:endParaRPr lang="en-US" sz="1400" dirty="0"/>
+          </a:p>
+        </p:txBody>
+      </p:sp>
+      <p:cxnSp>
+        <p:nvCxnSpPr>
+          <p:cNvPr id="18" name="Straight Arrow Connector 17">
+            <a:extLst>
+              <a:ext uri="{FF2B5EF4-FFF2-40B4-BE49-F238E27FC236}">
+                <a16:creationId xmlns:a16="http://schemas.microsoft.com/office/drawing/2014/main" id="{54980B91-232E-AE50-0E9D-6C2CA3A2C392}"/>
+              </a:ext>
+            </a:extLst>
+          </p:cNvPr>
+          <p:cNvCxnSpPr>
+            <a:cxnSpLocks/>
+          </p:cNvCxnSpPr>
+          <p:nvPr/>
+        </p:nvCxnSpPr>
+        <p:spPr>
+          <a:xfrm flipV="1">
+            <a:off x="5486080" y="3280426"/>
+            <a:ext cx="572957" cy="269712"/>
+          </a:xfrm>
+          <a:prstGeom prst="straightConnector1">
+            <a:avLst/>
+          </a:prstGeom>
+          <a:ln>
+            <a:solidFill>
+              <a:srgbClr val="1D86EE"/>
+            </a:solidFill>
+            <a:tailEnd type="triangle"/>
+          </a:ln>
+        </p:spPr>
+        <p:style>
+          <a:lnRef idx="2">
+            <a:schemeClr val="accent1"/>
+          </a:lnRef>
+          <a:fillRef idx="0">
+            <a:schemeClr val="accent1"/>
+          </a:fillRef>
+          <a:effectRef idx="1">
+            <a:schemeClr val="accent1"/>
+          </a:effectRef>
+          <a:fontRef idx="minor">
+            <a:schemeClr val="tx1"/>
+          </a:fontRef>
+        </p:style>
+      </p:cxnSp>
+      <p:sp>
+        <p:nvSpPr>
+          <p:cNvPr id="19" name="TextBox 18">
+            <a:extLst>
+              <a:ext uri="{FF2B5EF4-FFF2-40B4-BE49-F238E27FC236}">
+                <a16:creationId xmlns:a16="http://schemas.microsoft.com/office/drawing/2014/main" id="{6D07C209-1B60-0389-353E-3AC7CA0959B8}"/>
+              </a:ext>
+            </a:extLst>
+          </p:cNvPr>
+          <p:cNvSpPr txBox="1"/>
+          <p:nvPr/>
+        </p:nvSpPr>
+        <p:spPr>
+          <a:xfrm>
+            <a:off x="5693230" y="3379650"/>
+            <a:ext cx="588229" cy="276999"/>
+          </a:xfrm>
+          <a:prstGeom prst="rect">
+            <a:avLst/>
+          </a:prstGeom>
+          <a:noFill/>
+        </p:spPr>
+        <p:txBody>
+          <a:bodyPr wrap="square" rtlCol="0">
+            <a:spAutoFit/>
+          </a:bodyPr>
+          <a:lstStyle/>
+          <a:p>
+            <a:r>
+              <a:rPr lang="en-US" sz="1200" dirty="0"/>
+              <a:t>E</a:t>
+            </a:r>
+            <a:r>
+              <a:rPr lang="en-US" sz="1200" baseline="-25000" dirty="0"/>
+              <a:t>rb</a:t>
+            </a:r>
+            <a:endParaRPr lang="en-US" sz="1200" dirty="0"/>
+          </a:p>
+        </p:txBody>
+      </p:sp>
+      <p:cxnSp>
+        <p:nvCxnSpPr>
+          <p:cNvPr id="21" name="Straight Arrow Connector 20">
+            <a:extLst>
+              <a:ext uri="{FF2B5EF4-FFF2-40B4-BE49-F238E27FC236}">
+                <a16:creationId xmlns:a16="http://schemas.microsoft.com/office/drawing/2014/main" id="{01E19F28-2AFC-D3BD-997D-F851A5AB766C}"/>
+              </a:ext>
+            </a:extLst>
+          </p:cNvPr>
+          <p:cNvCxnSpPr>
+            <a:cxnSpLocks/>
+          </p:cNvCxnSpPr>
+          <p:nvPr/>
+        </p:nvCxnSpPr>
+        <p:spPr>
+          <a:xfrm flipV="1">
+            <a:off x="5531575" y="3033159"/>
+            <a:ext cx="609601" cy="160029"/>
+          </a:xfrm>
+          <a:prstGeom prst="straightConnector1">
+            <a:avLst/>
+          </a:prstGeom>
+          <a:ln>
+            <a:solidFill>
+              <a:srgbClr val="003D88"/>
+            </a:solidFill>
+            <a:tailEnd type="triangle"/>
+          </a:ln>
+        </p:spPr>
+        <p:style>
+          <a:lnRef idx="2">
+            <a:schemeClr val="accent1"/>
+          </a:lnRef>
+          <a:fillRef idx="0">
+            <a:schemeClr val="accent1"/>
+          </a:fillRef>
+          <a:effectRef idx="1">
+            <a:schemeClr val="accent1"/>
+          </a:effectRef>
+          <a:fontRef idx="minor">
+            <a:schemeClr val="tx1"/>
+          </a:fontRef>
+        </p:style>
+      </p:cxnSp>
+      <p:sp>
+        <p:nvSpPr>
+          <p:cNvPr id="23" name="TextBox 22">
+            <a:extLst>
+              <a:ext uri="{FF2B5EF4-FFF2-40B4-BE49-F238E27FC236}">
+                <a16:creationId xmlns:a16="http://schemas.microsoft.com/office/drawing/2014/main" id="{3A951EE5-37DC-DEB2-A846-F3F39C5E38C3}"/>
+              </a:ext>
+            </a:extLst>
+          </p:cNvPr>
+          <p:cNvSpPr txBox="1"/>
+          <p:nvPr/>
+        </p:nvSpPr>
+        <p:spPr>
+          <a:xfrm>
+            <a:off x="5589615" y="2822377"/>
+            <a:ext cx="588229" cy="276999"/>
+          </a:xfrm>
+          <a:prstGeom prst="rect">
+            <a:avLst/>
+          </a:prstGeom>
+          <a:noFill/>
+        </p:spPr>
+        <p:txBody>
+          <a:bodyPr wrap="square" rtlCol="0">
+            <a:spAutoFit/>
+          </a:bodyPr>
+          <a:lstStyle/>
+          <a:p>
+            <a:r>
+              <a:rPr lang="en-US" sz="1200" dirty="0"/>
+              <a:t>E</a:t>
+            </a:r>
+            <a:r>
+              <a:rPr lang="en-US" sz="1200" baseline="-25000" dirty="0"/>
+              <a:t>ra</a:t>
+            </a:r>
+            <a:endParaRPr lang="en-US" sz="1200" dirty="0"/>
+          </a:p>
+        </p:txBody>
+      </p:sp>
+    </p:spTree>
+    <p:extLst>
+      <p:ext uri="{BB962C8B-B14F-4D97-AF65-F5344CB8AC3E}">
+        <p14:creationId xmlns:p14="http://schemas.microsoft.com/office/powerpoint/2010/main" val="1742207764"/>
+      </p:ext>
+    </p:extLst>
+  </p:cSld>
+  <p:clrMapOvr>
+    <a:masterClrMapping/>
+  </p:clrMapOvr>
+</p:sld>
+</file>
+
+<file path=ppt/slides/slide9.xml><?xml version="1.0" encoding="utf-8"?>
 <p:sld xmlns:a="http://schemas.openxmlformats.org/drawingml/2006/main" xmlns:r="http://schemas.openxmlformats.org/officeDocument/2006/relationships" xmlns:p="http://schemas.openxmlformats.org/presentationml/2006/main">
   <p:cSld>
     <p:spTree>

</xml_diff>

<commit_message>
scenario niche center/width diagrams
</commit_message>
<xml_diff>
--- a/figures/kd-figs/conceptual.pptx
+++ b/figures/kd-figs/conceptual.pptx
@@ -8,15 +8,15 @@
     <p:notesMasterId r:id="rId11"/>
   </p:notesMasterIdLst>
   <p:sldIdLst>
-    <p:sldId id="256" r:id="rId2"/>
-    <p:sldId id="260" r:id="rId3"/>
-    <p:sldId id="257" r:id="rId4"/>
-    <p:sldId id="258" r:id="rId5"/>
-    <p:sldId id="259" r:id="rId6"/>
-    <p:sldId id="263" r:id="rId7"/>
-    <p:sldId id="261" r:id="rId8"/>
-    <p:sldId id="264" r:id="rId9"/>
-    <p:sldId id="262" r:id="rId10"/>
+    <p:sldId id="260" r:id="rId2"/>
+    <p:sldId id="257" r:id="rId3"/>
+    <p:sldId id="258" r:id="rId4"/>
+    <p:sldId id="259" r:id="rId5"/>
+    <p:sldId id="263" r:id="rId6"/>
+    <p:sldId id="261" r:id="rId7"/>
+    <p:sldId id="264" r:id="rId8"/>
+    <p:sldId id="265" r:id="rId9"/>
+    <p:sldId id="266" r:id="rId10"/>
   </p:sldIdLst>
   <p:sldSz cx="12192000" cy="6858000"/>
   <p:notesSz cx="6858000" cy="9144000"/>
@@ -205,7 +205,7 @@
           <a:p>
             <a:fld id="{5F0BAA97-B2B8-EA40-A7C9-10EAB2FFF9B3}" type="datetimeFigureOut">
               <a:rPr lang="en-US" smtClean="0"/>
-              <a:t>8/23/25</a:t>
+              <a:t>9/18/25</a:t>
             </a:fld>
             <a:endParaRPr lang="en-US"/>
           </a:p>
@@ -619,7 +619,7 @@
           <a:p>
             <a:fld id="{DF4DC901-9D7D-5040-9AC4-ED1AFACCCDE5}" type="datetimeFigureOut">
               <a:rPr lang="en-US" smtClean="0"/>
-              <a:t>8/23/25</a:t>
+              <a:t>9/18/25</a:t>
             </a:fld>
             <a:endParaRPr lang="en-US"/>
           </a:p>
@@ -817,7 +817,7 @@
           <a:p>
             <a:fld id="{DF4DC901-9D7D-5040-9AC4-ED1AFACCCDE5}" type="datetimeFigureOut">
               <a:rPr lang="en-US" smtClean="0"/>
-              <a:t>8/23/25</a:t>
+              <a:t>9/18/25</a:t>
             </a:fld>
             <a:endParaRPr lang="en-US"/>
           </a:p>
@@ -1025,7 +1025,7 @@
           <a:p>
             <a:fld id="{DF4DC901-9D7D-5040-9AC4-ED1AFACCCDE5}" type="datetimeFigureOut">
               <a:rPr lang="en-US" smtClean="0"/>
-              <a:t>8/23/25</a:t>
+              <a:t>9/18/25</a:t>
             </a:fld>
             <a:endParaRPr lang="en-US"/>
           </a:p>
@@ -1223,7 +1223,7 @@
           <a:p>
             <a:fld id="{DF4DC901-9D7D-5040-9AC4-ED1AFACCCDE5}" type="datetimeFigureOut">
               <a:rPr lang="en-US" smtClean="0"/>
-              <a:t>8/23/25</a:t>
+              <a:t>9/18/25</a:t>
             </a:fld>
             <a:endParaRPr lang="en-US"/>
           </a:p>
@@ -1498,7 +1498,7 @@
           <a:p>
             <a:fld id="{DF4DC901-9D7D-5040-9AC4-ED1AFACCCDE5}" type="datetimeFigureOut">
               <a:rPr lang="en-US" smtClean="0"/>
-              <a:t>8/23/25</a:t>
+              <a:t>9/18/25</a:t>
             </a:fld>
             <a:endParaRPr lang="en-US"/>
           </a:p>
@@ -1763,7 +1763,7 @@
           <a:p>
             <a:fld id="{DF4DC901-9D7D-5040-9AC4-ED1AFACCCDE5}" type="datetimeFigureOut">
               <a:rPr lang="en-US" smtClean="0"/>
-              <a:t>8/23/25</a:t>
+              <a:t>9/18/25</a:t>
             </a:fld>
             <a:endParaRPr lang="en-US"/>
           </a:p>
@@ -2175,7 +2175,7 @@
           <a:p>
             <a:fld id="{DF4DC901-9D7D-5040-9AC4-ED1AFACCCDE5}" type="datetimeFigureOut">
               <a:rPr lang="en-US" smtClean="0"/>
-              <a:t>8/23/25</a:t>
+              <a:t>9/18/25</a:t>
             </a:fld>
             <a:endParaRPr lang="en-US"/>
           </a:p>
@@ -2316,7 +2316,7 @@
           <a:p>
             <a:fld id="{DF4DC901-9D7D-5040-9AC4-ED1AFACCCDE5}" type="datetimeFigureOut">
               <a:rPr lang="en-US" smtClean="0"/>
-              <a:t>8/23/25</a:t>
+              <a:t>9/18/25</a:t>
             </a:fld>
             <a:endParaRPr lang="en-US"/>
           </a:p>
@@ -2429,7 +2429,7 @@
           <a:p>
             <a:fld id="{DF4DC901-9D7D-5040-9AC4-ED1AFACCCDE5}" type="datetimeFigureOut">
               <a:rPr lang="en-US" smtClean="0"/>
-              <a:t>8/23/25</a:t>
+              <a:t>9/18/25</a:t>
             </a:fld>
             <a:endParaRPr lang="en-US"/>
           </a:p>
@@ -2740,7 +2740,7 @@
           <a:p>
             <a:fld id="{DF4DC901-9D7D-5040-9AC4-ED1AFACCCDE5}" type="datetimeFigureOut">
               <a:rPr lang="en-US" smtClean="0"/>
-              <a:t>8/23/25</a:t>
+              <a:t>9/18/25</a:t>
             </a:fld>
             <a:endParaRPr lang="en-US"/>
           </a:p>
@@ -3028,7 +3028,7 @@
           <a:p>
             <a:fld id="{DF4DC901-9D7D-5040-9AC4-ED1AFACCCDE5}" type="datetimeFigureOut">
               <a:rPr lang="en-US" smtClean="0"/>
-              <a:t>8/23/25</a:t>
+              <a:t>9/18/25</a:t>
             </a:fld>
             <a:endParaRPr lang="en-US"/>
           </a:p>
@@ -3269,7 +3269,7 @@
           <a:p>
             <a:fld id="{DF4DC901-9D7D-5040-9AC4-ED1AFACCCDE5}" type="datetimeFigureOut">
               <a:rPr lang="en-US" smtClean="0"/>
-              <a:t>8/23/25</a:t>
+              <a:t>9/18/25</a:t>
             </a:fld>
             <a:endParaRPr lang="en-US"/>
           </a:p>
@@ -3688,10 +3688,10 @@
       </p:grpSpPr>
       <p:pic>
         <p:nvPicPr>
-          <p:cNvPr id="5" name="Picture 4" descr="A diagram of a red explosion&#10;&#10;AI-generated content may be incorrect.">
-            <a:extLst>
-              <a:ext uri="{FF2B5EF4-FFF2-40B4-BE49-F238E27FC236}">
-                <a16:creationId xmlns:a16="http://schemas.microsoft.com/office/drawing/2014/main" id="{581FC5BE-8F55-C2D3-FACE-47A149819648}"/>
+          <p:cNvPr id="5" name="Picture 4" descr="A blue and yellow line&#10;&#10;AI-generated content may be incorrect.">
+            <a:extLst>
+              <a:ext uri="{FF2B5EF4-FFF2-40B4-BE49-F238E27FC236}">
+                <a16:creationId xmlns:a16="http://schemas.microsoft.com/office/drawing/2014/main" id="{46FB36E7-DE95-36F1-CA9C-EE4C03679A3E}"/>
               </a:ext>
             </a:extLst>
           </p:cNvPr>
@@ -3708,372 +3708,47 @@
         </p:blipFill>
         <p:spPr>
           <a:xfrm>
-            <a:off x="1970756" y="0"/>
-            <a:ext cx="7772400" cy="6460602"/>
+            <a:off x="1082003" y="1507441"/>
+            <a:ext cx="4584700" cy="4445000"/>
           </a:xfrm>
           <a:prstGeom prst="rect">
             <a:avLst/>
           </a:prstGeom>
         </p:spPr>
       </p:pic>
-      <p:cxnSp>
-        <p:nvCxnSpPr>
-          <p:cNvPr id="7" name="Straight Connector 6">
-            <a:extLst>
-              <a:ext uri="{FF2B5EF4-FFF2-40B4-BE49-F238E27FC236}">
-                <a16:creationId xmlns:a16="http://schemas.microsoft.com/office/drawing/2014/main" id="{ACFA0EE8-3CB7-90DF-FF08-239732A07CF8}"/>
-              </a:ext>
-            </a:extLst>
-          </p:cNvPr>
-          <p:cNvCxnSpPr>
-            <a:cxnSpLocks/>
-          </p:cNvCxnSpPr>
-          <p:nvPr/>
-        </p:nvCxnSpPr>
-        <p:spPr>
-          <a:xfrm>
-            <a:off x="6665205" y="407624"/>
-            <a:ext cx="0" cy="5475383"/>
-          </a:xfrm>
-          <a:prstGeom prst="line">
-            <a:avLst/>
-          </a:prstGeom>
-          <a:ln w="38100">
-            <a:solidFill>
-              <a:schemeClr val="tx1"/>
-            </a:solidFill>
-          </a:ln>
-        </p:spPr>
-        <p:style>
-          <a:lnRef idx="2">
-            <a:schemeClr val="dk1"/>
-          </a:lnRef>
-          <a:fillRef idx="0">
-            <a:schemeClr val="dk1"/>
-          </a:fillRef>
-          <a:effectRef idx="1">
-            <a:schemeClr val="dk1"/>
-          </a:effectRef>
-          <a:fontRef idx="minor">
-            <a:schemeClr val="tx1"/>
-          </a:fontRef>
-        </p:style>
-      </p:cxnSp>
-      <p:cxnSp>
-        <p:nvCxnSpPr>
-          <p:cNvPr id="9" name="Straight Connector 8">
-            <a:extLst>
-              <a:ext uri="{FF2B5EF4-FFF2-40B4-BE49-F238E27FC236}">
-                <a16:creationId xmlns:a16="http://schemas.microsoft.com/office/drawing/2014/main" id="{604546A6-1B8A-E60D-7D0A-A455E50C2F77}"/>
-              </a:ext>
-            </a:extLst>
-          </p:cNvPr>
-          <p:cNvCxnSpPr>
-            <a:cxnSpLocks/>
-          </p:cNvCxnSpPr>
-          <p:nvPr/>
-        </p:nvCxnSpPr>
-        <p:spPr>
-          <a:xfrm>
-            <a:off x="2776251" y="2423712"/>
-            <a:ext cx="5827922" cy="0"/>
-          </a:xfrm>
-          <a:prstGeom prst="line">
-            <a:avLst/>
-          </a:prstGeom>
-          <a:ln w="38100">
-            <a:solidFill>
-              <a:schemeClr val="tx1"/>
-            </a:solidFill>
-          </a:ln>
-        </p:spPr>
-        <p:style>
-          <a:lnRef idx="2">
-            <a:schemeClr val="dk1"/>
-          </a:lnRef>
-          <a:fillRef idx="0">
-            <a:schemeClr val="dk1"/>
-          </a:fillRef>
-          <a:effectRef idx="1">
-            <a:schemeClr val="dk1"/>
-          </a:effectRef>
-          <a:fontRef idx="minor">
-            <a:schemeClr val="tx1"/>
-          </a:fontRef>
-        </p:style>
-      </p:cxnSp>
-      <p:sp>
-        <p:nvSpPr>
-          <p:cNvPr id="12" name="Rectangle 11">
-            <a:extLst>
-              <a:ext uri="{FF2B5EF4-FFF2-40B4-BE49-F238E27FC236}">
-                <a16:creationId xmlns:a16="http://schemas.microsoft.com/office/drawing/2014/main" id="{64C31A48-9C55-7CDE-B1AE-B97863C6BFED}"/>
-              </a:ext>
-            </a:extLst>
-          </p:cNvPr>
-          <p:cNvSpPr/>
-          <p:nvPr/>
-        </p:nvSpPr>
-        <p:spPr>
-          <a:xfrm>
-            <a:off x="2776251" y="110166"/>
-            <a:ext cx="5827922" cy="2302526"/>
-          </a:xfrm>
-          <a:prstGeom prst="rect">
-            <a:avLst/>
-          </a:prstGeom>
-          <a:solidFill>
-            <a:srgbClr val="C1E5F5">
-              <a:alpha val="43137"/>
-            </a:srgbClr>
-          </a:solidFill>
-        </p:spPr>
-        <p:style>
-          <a:lnRef idx="2">
-            <a:schemeClr val="accent1">
-              <a:shade val="15000"/>
-            </a:schemeClr>
-          </a:lnRef>
-          <a:fillRef idx="1">
-            <a:schemeClr val="accent1"/>
-          </a:fillRef>
-          <a:effectRef idx="0">
-            <a:schemeClr val="accent1"/>
-          </a:effectRef>
-          <a:fontRef idx="minor">
-            <a:schemeClr val="lt1"/>
-          </a:fontRef>
-        </p:style>
-        <p:txBody>
-          <a:bodyPr rtlCol="0" anchor="ctr"/>
-          <a:lstStyle/>
-          <a:p>
-            <a:pPr algn="ctr"/>
-            <a:endParaRPr lang="en-US" b="1" dirty="0">
-              <a:solidFill>
-                <a:sysClr val="windowText" lastClr="000000"/>
-              </a:solidFill>
-            </a:endParaRPr>
-          </a:p>
-        </p:txBody>
-      </p:sp>
-      <p:sp>
-        <p:nvSpPr>
-          <p:cNvPr id="14" name="Rectangle 13">
-            <a:extLst>
-              <a:ext uri="{FF2B5EF4-FFF2-40B4-BE49-F238E27FC236}">
-                <a16:creationId xmlns:a16="http://schemas.microsoft.com/office/drawing/2014/main" id="{D40591E2-8B43-B725-769E-C5B944868FFF}"/>
-              </a:ext>
-            </a:extLst>
-          </p:cNvPr>
-          <p:cNvSpPr/>
-          <p:nvPr/>
-        </p:nvSpPr>
-        <p:spPr>
-          <a:xfrm>
-            <a:off x="2776251" y="2423711"/>
-            <a:ext cx="3888954" cy="3459296"/>
-          </a:xfrm>
-          <a:prstGeom prst="rect">
-            <a:avLst/>
-          </a:prstGeom>
-          <a:solidFill>
-            <a:schemeClr val="accent5">
-              <a:lumMod val="20000"/>
-              <a:lumOff val="80000"/>
-              <a:alpha val="43137"/>
-            </a:schemeClr>
-          </a:solidFill>
-          <a:ln>
-            <a:solidFill>
-              <a:schemeClr val="tx1"/>
-            </a:solidFill>
-          </a:ln>
-        </p:spPr>
-        <p:style>
-          <a:lnRef idx="2">
-            <a:schemeClr val="accent1">
-              <a:shade val="15000"/>
-            </a:schemeClr>
-          </a:lnRef>
-          <a:fillRef idx="1">
-            <a:schemeClr val="accent1"/>
-          </a:fillRef>
-          <a:effectRef idx="0">
-            <a:schemeClr val="accent1"/>
-          </a:effectRef>
-          <a:fontRef idx="minor">
-            <a:schemeClr val="lt1"/>
-          </a:fontRef>
-        </p:style>
-        <p:txBody>
-          <a:bodyPr rtlCol="0" anchor="ctr"/>
-          <a:lstStyle/>
-          <a:p>
-            <a:pPr algn="ctr"/>
-            <a:r>
-              <a:rPr lang="en-US" b="1" dirty="0">
-                <a:solidFill>
-                  <a:sysClr val="windowText" lastClr="000000"/>
-                </a:solidFill>
-              </a:rPr>
-              <a:t>TOWARD </a:t>
-            </a:r>
-          </a:p>
-          <a:p>
-            <a:pPr algn="ctr"/>
-            <a:r>
-              <a:rPr lang="en-US" b="1" dirty="0">
-                <a:solidFill>
-                  <a:sysClr val="windowText" lastClr="000000"/>
-                </a:solidFill>
-              </a:rPr>
-              <a:t>NEUTRALITY</a:t>
-            </a:r>
-          </a:p>
-        </p:txBody>
-      </p:sp>
-      <p:sp>
-        <p:nvSpPr>
-          <p:cNvPr id="15" name="Rectangle 14">
-            <a:extLst>
-              <a:ext uri="{FF2B5EF4-FFF2-40B4-BE49-F238E27FC236}">
-                <a16:creationId xmlns:a16="http://schemas.microsoft.com/office/drawing/2014/main" id="{9A5A882B-2E8B-095B-FB06-15DED5678B52}"/>
-              </a:ext>
-            </a:extLst>
-          </p:cNvPr>
-          <p:cNvSpPr/>
-          <p:nvPr/>
-        </p:nvSpPr>
-        <p:spPr>
-          <a:xfrm>
-            <a:off x="6656942" y="2423711"/>
-            <a:ext cx="1944476" cy="3459291"/>
-          </a:xfrm>
-          <a:prstGeom prst="rect">
-            <a:avLst/>
-          </a:prstGeom>
-          <a:solidFill>
-            <a:srgbClr val="C1E5F5">
-              <a:alpha val="43137"/>
-            </a:srgbClr>
-          </a:solidFill>
-        </p:spPr>
-        <p:style>
-          <a:lnRef idx="2">
-            <a:schemeClr val="accent1">
-              <a:shade val="15000"/>
-            </a:schemeClr>
-          </a:lnRef>
-          <a:fillRef idx="1">
-            <a:schemeClr val="accent1"/>
-          </a:fillRef>
-          <a:effectRef idx="0">
-            <a:schemeClr val="accent1"/>
-          </a:effectRef>
-          <a:fontRef idx="minor">
-            <a:schemeClr val="lt1"/>
-          </a:fontRef>
-        </p:style>
-        <p:txBody>
-          <a:bodyPr rtlCol="0" anchor="ctr"/>
-          <a:lstStyle/>
-          <a:p>
-            <a:pPr algn="ctr"/>
-            <a:endParaRPr lang="en-US" dirty="0"/>
-          </a:p>
-        </p:txBody>
-      </p:sp>
-      <p:sp>
-        <p:nvSpPr>
-          <p:cNvPr id="16" name="TextBox 15">
-            <a:extLst>
-              <a:ext uri="{FF2B5EF4-FFF2-40B4-BE49-F238E27FC236}">
-                <a16:creationId xmlns:a16="http://schemas.microsoft.com/office/drawing/2014/main" id="{D4CB6D70-38AF-47A0-2935-EF4C34031A10}"/>
-              </a:ext>
-            </a:extLst>
-          </p:cNvPr>
-          <p:cNvSpPr txBox="1"/>
-          <p:nvPr/>
-        </p:nvSpPr>
-        <p:spPr>
-          <a:xfrm>
-            <a:off x="4015649" y="651827"/>
-            <a:ext cx="3349126" cy="646331"/>
-          </a:xfrm>
-          <a:prstGeom prst="rect">
-            <a:avLst/>
-          </a:prstGeom>
-          <a:noFill/>
-        </p:spPr>
-        <p:txBody>
-          <a:bodyPr wrap="square" rtlCol="0">
-            <a:spAutoFit/>
-          </a:bodyPr>
-          <a:lstStyle/>
-          <a:p>
-            <a:pPr algn="ctr"/>
-            <a:r>
-              <a:rPr lang="en-US" b="1" dirty="0"/>
-              <a:t>AWAY FROM </a:t>
-            </a:r>
-          </a:p>
-          <a:p>
-            <a:pPr algn="ctr"/>
-            <a:r>
-              <a:rPr lang="en-US" b="1" dirty="0"/>
-              <a:t>NEUTRALITY</a:t>
-            </a:r>
-          </a:p>
-        </p:txBody>
-      </p:sp>
-      <p:sp>
-        <p:nvSpPr>
-          <p:cNvPr id="17" name="TextBox 16">
-            <a:extLst>
-              <a:ext uri="{FF2B5EF4-FFF2-40B4-BE49-F238E27FC236}">
-                <a16:creationId xmlns:a16="http://schemas.microsoft.com/office/drawing/2014/main" id="{89D2A802-8F34-CA32-E377-8AA61CE724C2}"/>
-              </a:ext>
-            </a:extLst>
-          </p:cNvPr>
-          <p:cNvSpPr txBox="1"/>
-          <p:nvPr/>
-        </p:nvSpPr>
-        <p:spPr>
-          <a:xfrm rot="5400000">
-            <a:off x="6295672" y="3962396"/>
-            <a:ext cx="3349126" cy="646331"/>
-          </a:xfrm>
-          <a:prstGeom prst="rect">
-            <a:avLst/>
-          </a:prstGeom>
-          <a:noFill/>
-        </p:spPr>
-        <p:txBody>
-          <a:bodyPr wrap="square" rtlCol="0">
-            <a:spAutoFit/>
-          </a:bodyPr>
-          <a:lstStyle/>
-          <a:p>
-            <a:pPr algn="ctr"/>
-            <a:r>
-              <a:rPr lang="en-US" b="1" dirty="0"/>
-              <a:t>AWAY FROM </a:t>
-            </a:r>
-          </a:p>
-          <a:p>
-            <a:pPr algn="ctr"/>
-            <a:r>
-              <a:rPr lang="en-US" b="1" dirty="0"/>
-              <a:t>NEUTRALITY</a:t>
-            </a:r>
-          </a:p>
-        </p:txBody>
-      </p:sp>
+      <p:pic>
+        <p:nvPicPr>
+          <p:cNvPr id="7" name="Picture 6">
+            <a:extLst>
+              <a:ext uri="{FF2B5EF4-FFF2-40B4-BE49-F238E27FC236}">
+                <a16:creationId xmlns:a16="http://schemas.microsoft.com/office/drawing/2014/main" id="{5687B8C4-5C79-DBA7-FF10-EE462AD4389D}"/>
+              </a:ext>
+            </a:extLst>
+          </p:cNvPr>
+          <p:cNvPicPr>
+            <a:picLocks noChangeAspect="1"/>
+          </p:cNvPicPr>
+          <p:nvPr/>
+        </p:nvPicPr>
+        <p:blipFill>
+          <a:blip r:embed="rId3"/>
+          <a:srcRect/>
+          <a:stretch/>
+        </p:blipFill>
+        <p:spPr>
+          <a:xfrm>
+            <a:off x="6001400" y="1507441"/>
+            <a:ext cx="4907158" cy="4444999"/>
+          </a:xfrm>
+          <a:prstGeom prst="rect">
+            <a:avLst/>
+          </a:prstGeom>
+        </p:spPr>
+      </p:pic>
     </p:spTree>
     <p:extLst>
       <p:ext uri="{BB962C8B-B14F-4D97-AF65-F5344CB8AC3E}">
-        <p14:creationId xmlns:p14="http://schemas.microsoft.com/office/powerpoint/2010/main" val="3059908520"/>
+        <p14:creationId xmlns:p14="http://schemas.microsoft.com/office/powerpoint/2010/main" val="1077596209"/>
       </p:ext>
     </p:extLst>
   </p:cSld>
@@ -4100,95 +3775,6 @@
           <a:chExt cx="0" cy="0"/>
         </a:xfrm>
       </p:grpSpPr>
-      <p:pic>
-        <p:nvPicPr>
-          <p:cNvPr id="5" name="Picture 4" descr="A blue and yellow line&#10;&#10;AI-generated content may be incorrect.">
-            <a:extLst>
-              <a:ext uri="{FF2B5EF4-FFF2-40B4-BE49-F238E27FC236}">
-                <a16:creationId xmlns:a16="http://schemas.microsoft.com/office/drawing/2014/main" id="{46FB36E7-DE95-36F1-CA9C-EE4C03679A3E}"/>
-              </a:ext>
-            </a:extLst>
-          </p:cNvPr>
-          <p:cNvPicPr>
-            <a:picLocks noChangeAspect="1"/>
-          </p:cNvPicPr>
-          <p:nvPr/>
-        </p:nvPicPr>
-        <p:blipFill>
-          <a:blip r:embed="rId2"/>
-          <a:stretch>
-            <a:fillRect/>
-          </a:stretch>
-        </p:blipFill>
-        <p:spPr>
-          <a:xfrm>
-            <a:off x="1082003" y="1507441"/>
-            <a:ext cx="4584700" cy="4445000"/>
-          </a:xfrm>
-          <a:prstGeom prst="rect">
-            <a:avLst/>
-          </a:prstGeom>
-        </p:spPr>
-      </p:pic>
-      <p:pic>
-        <p:nvPicPr>
-          <p:cNvPr id="7" name="Picture 6">
-            <a:extLst>
-              <a:ext uri="{FF2B5EF4-FFF2-40B4-BE49-F238E27FC236}">
-                <a16:creationId xmlns:a16="http://schemas.microsoft.com/office/drawing/2014/main" id="{5687B8C4-5C79-DBA7-FF10-EE462AD4389D}"/>
-              </a:ext>
-            </a:extLst>
-          </p:cNvPr>
-          <p:cNvPicPr>
-            <a:picLocks noChangeAspect="1"/>
-          </p:cNvPicPr>
-          <p:nvPr/>
-        </p:nvPicPr>
-        <p:blipFill>
-          <a:blip r:embed="rId3"/>
-          <a:srcRect/>
-          <a:stretch/>
-        </p:blipFill>
-        <p:spPr>
-          <a:xfrm>
-            <a:off x="6001400" y="1507441"/>
-            <a:ext cx="4907158" cy="4444999"/>
-          </a:xfrm>
-          <a:prstGeom prst="rect">
-            <a:avLst/>
-          </a:prstGeom>
-        </p:spPr>
-      </p:pic>
-    </p:spTree>
-    <p:extLst>
-      <p:ext uri="{BB962C8B-B14F-4D97-AF65-F5344CB8AC3E}">
-        <p14:creationId xmlns:p14="http://schemas.microsoft.com/office/powerpoint/2010/main" val="1077596209"/>
-      </p:ext>
-    </p:extLst>
-  </p:cSld>
-  <p:clrMapOvr>
-    <a:masterClrMapping/>
-  </p:clrMapOvr>
-</p:sld>
-</file>
-
-<file path=ppt/slides/slide3.xml><?xml version="1.0" encoding="utf-8"?>
-<p:sld xmlns:a="http://schemas.openxmlformats.org/drawingml/2006/main" xmlns:r="http://schemas.openxmlformats.org/officeDocument/2006/relationships" xmlns:p="http://schemas.openxmlformats.org/presentationml/2006/main">
-  <p:cSld>
-    <p:spTree>
-      <p:nvGrpSpPr>
-        <p:cNvPr id="1" name=""/>
-        <p:cNvGrpSpPr/>
-        <p:nvPr/>
-      </p:nvGrpSpPr>
-      <p:grpSpPr>
-        <a:xfrm>
-          <a:off x="0" y="0"/>
-          <a:ext cx="0" cy="0"/>
-          <a:chOff x="0" y="0"/>
-          <a:chExt cx="0" cy="0"/>
-        </a:xfrm>
-      </p:grpSpPr>
       <p:sp>
         <p:nvSpPr>
           <p:cNvPr id="4" name="Rounded Rectangle 3">
@@ -5125,7 +4711,7 @@
 </p:sld>
 </file>
 
-<file path=ppt/slides/slide4.xml><?xml version="1.0" encoding="utf-8"?>
+<file path=ppt/slides/slide3.xml><?xml version="1.0" encoding="utf-8"?>
 <p:sld xmlns:a="http://schemas.openxmlformats.org/drawingml/2006/main" xmlns:r="http://schemas.openxmlformats.org/officeDocument/2006/relationships" xmlns:p="http://schemas.openxmlformats.org/presentationml/2006/main">
   <p:cSld>
     <p:spTree>
@@ -6036,7 +5622,7 @@
 </p:sld>
 </file>
 
-<file path=ppt/slides/slide5.xml><?xml version="1.0" encoding="utf-8"?>
+<file path=ppt/slides/slide4.xml><?xml version="1.0" encoding="utf-8"?>
 <p:sld xmlns:a="http://schemas.openxmlformats.org/drawingml/2006/main" xmlns:r="http://schemas.openxmlformats.org/officeDocument/2006/relationships" xmlns:p="http://schemas.openxmlformats.org/presentationml/2006/main">
   <p:cSld>
     <p:spTree>
@@ -7360,7 +6946,7 @@
 </p:sld>
 </file>
 
-<file path=ppt/slides/slide6.xml><?xml version="1.0" encoding="utf-8"?>
+<file path=ppt/slides/slide5.xml><?xml version="1.0" encoding="utf-8"?>
 <p:sld xmlns:a="http://schemas.openxmlformats.org/drawingml/2006/main" xmlns:r="http://schemas.openxmlformats.org/officeDocument/2006/relationships" xmlns:p="http://schemas.openxmlformats.org/presentationml/2006/main">
   <p:cSld>
     <p:spTree>
@@ -7854,7 +7440,7 @@
 </p:sld>
 </file>
 
-<file path=ppt/slides/slide7.xml><?xml version="1.0" encoding="utf-8"?>
+<file path=ppt/slides/slide6.xml><?xml version="1.0" encoding="utf-8"?>
 <p:sld xmlns:a="http://schemas.openxmlformats.org/drawingml/2006/main" xmlns:r="http://schemas.openxmlformats.org/officeDocument/2006/relationships" xmlns:p="http://schemas.openxmlformats.org/presentationml/2006/main">
   <p:cSld>
     <p:spTree>
@@ -9211,6 +8797,466 @@
     <p:extLst>
       <p:ext uri="{BB962C8B-B14F-4D97-AF65-F5344CB8AC3E}">
         <p14:creationId xmlns:p14="http://schemas.microsoft.com/office/powerpoint/2010/main" val="3671380772"/>
+      </p:ext>
+    </p:extLst>
+  </p:cSld>
+  <p:clrMapOvr>
+    <a:masterClrMapping/>
+  </p:clrMapOvr>
+</p:sld>
+</file>
+
+<file path=ppt/slides/slide7.xml><?xml version="1.0" encoding="utf-8"?>
+<p:sld xmlns:a="http://schemas.openxmlformats.org/drawingml/2006/main" xmlns:r="http://schemas.openxmlformats.org/officeDocument/2006/relationships" xmlns:p="http://schemas.openxmlformats.org/presentationml/2006/main">
+  <p:cSld>
+    <p:spTree>
+      <p:nvGrpSpPr>
+        <p:cNvPr id="1" name=""/>
+        <p:cNvGrpSpPr/>
+        <p:nvPr/>
+      </p:nvGrpSpPr>
+      <p:grpSpPr>
+        <a:xfrm>
+          <a:off x="0" y="0"/>
+          <a:ext cx="0" cy="0"/>
+          <a:chOff x="0" y="0"/>
+          <a:chExt cx="0" cy="0"/>
+        </a:xfrm>
+      </p:grpSpPr>
+      <p:pic>
+        <p:nvPicPr>
+          <p:cNvPr id="5" name="Picture 4">
+            <a:extLst>
+              <a:ext uri="{FF2B5EF4-FFF2-40B4-BE49-F238E27FC236}">
+                <a16:creationId xmlns:a16="http://schemas.microsoft.com/office/drawing/2014/main" id="{9F42E330-4C9C-5FF7-86F1-1FFE0DCAE1DF}"/>
+              </a:ext>
+            </a:extLst>
+          </p:cNvPr>
+          <p:cNvPicPr>
+            <a:picLocks noChangeAspect="1"/>
+          </p:cNvPicPr>
+          <p:nvPr/>
+        </p:nvPicPr>
+        <p:blipFill>
+          <a:blip r:embed="rId2"/>
+          <a:srcRect l="1850" r="3796"/>
+          <a:stretch/>
+        </p:blipFill>
+        <p:spPr>
+          <a:xfrm>
+            <a:off x="157164" y="1499919"/>
+            <a:ext cx="4260056" cy="3391344"/>
+          </a:xfrm>
+          <a:prstGeom prst="rect">
+            <a:avLst/>
+          </a:prstGeom>
+        </p:spPr>
+      </p:pic>
+      <p:pic>
+        <p:nvPicPr>
+          <p:cNvPr id="6" name="Picture 5">
+            <a:extLst>
+              <a:ext uri="{FF2B5EF4-FFF2-40B4-BE49-F238E27FC236}">
+                <a16:creationId xmlns:a16="http://schemas.microsoft.com/office/drawing/2014/main" id="{58DF6D50-0003-9D90-89CD-A7A95C592D66}"/>
+              </a:ext>
+            </a:extLst>
+          </p:cNvPr>
+          <p:cNvPicPr>
+            <a:picLocks noChangeAspect="1"/>
+          </p:cNvPicPr>
+          <p:nvPr/>
+        </p:nvPicPr>
+        <p:blipFill>
+          <a:blip r:embed="rId3"/>
+          <a:srcRect l="1900" r="1900"/>
+          <a:stretch/>
+        </p:blipFill>
+        <p:spPr>
+          <a:xfrm>
+            <a:off x="8512563" y="1604328"/>
+            <a:ext cx="3383345" cy="3589223"/>
+          </a:xfrm>
+          <a:prstGeom prst="rect">
+            <a:avLst/>
+          </a:prstGeom>
+        </p:spPr>
+      </p:pic>
+      <p:sp>
+        <p:nvSpPr>
+          <p:cNvPr id="7" name="TextBox 6">
+            <a:extLst>
+              <a:ext uri="{FF2B5EF4-FFF2-40B4-BE49-F238E27FC236}">
+                <a16:creationId xmlns:a16="http://schemas.microsoft.com/office/drawing/2014/main" id="{4F2FEA2F-D331-4DDD-9F3C-D7F39F3D33E2}"/>
+              </a:ext>
+            </a:extLst>
+          </p:cNvPr>
+          <p:cNvSpPr txBox="1"/>
+          <p:nvPr/>
+        </p:nvSpPr>
+        <p:spPr>
+          <a:xfrm>
+            <a:off x="3275084" y="495827"/>
+            <a:ext cx="4714369" cy="461665"/>
+          </a:xfrm>
+          <a:prstGeom prst="rect">
+            <a:avLst/>
+          </a:prstGeom>
+          <a:noFill/>
+        </p:spPr>
+        <p:txBody>
+          <a:bodyPr wrap="square" rtlCol="0">
+            <a:spAutoFit/>
+          </a:bodyPr>
+          <a:lstStyle/>
+          <a:p>
+            <a:r>
+              <a:rPr lang="en-US" sz="2400" dirty="0"/>
+              <a:t>Intra-process thermal asymmetry</a:t>
+            </a:r>
+          </a:p>
+        </p:txBody>
+      </p:sp>
+      <p:pic>
+        <p:nvPicPr>
+          <p:cNvPr id="9" name="Picture 8">
+            <a:extLst>
+              <a:ext uri="{FF2B5EF4-FFF2-40B4-BE49-F238E27FC236}">
+                <a16:creationId xmlns:a16="http://schemas.microsoft.com/office/drawing/2014/main" id="{9B1CBAB2-8000-6026-E623-397D34194199}"/>
+              </a:ext>
+            </a:extLst>
+          </p:cNvPr>
+          <p:cNvPicPr>
+            <a:picLocks noChangeAspect="1"/>
+          </p:cNvPicPr>
+          <p:nvPr/>
+        </p:nvPicPr>
+        <p:blipFill>
+          <a:blip r:embed="rId4"/>
+          <a:srcRect t="6370"/>
+          <a:stretch/>
+        </p:blipFill>
+        <p:spPr>
+          <a:xfrm>
+            <a:off x="4820059" y="1762735"/>
+            <a:ext cx="3326673" cy="3114762"/>
+          </a:xfrm>
+          <a:prstGeom prst="rect">
+            <a:avLst/>
+          </a:prstGeom>
+        </p:spPr>
+      </p:pic>
+      <p:pic>
+        <p:nvPicPr>
+          <p:cNvPr id="10" name="Picture 9" descr="A black text on a white background&#10;&#10;AI-generated content may be incorrect.">
+            <a:extLst>
+              <a:ext uri="{FF2B5EF4-FFF2-40B4-BE49-F238E27FC236}">
+                <a16:creationId xmlns:a16="http://schemas.microsoft.com/office/drawing/2014/main" id="{E2EBAB9A-D4FC-0920-24BD-F9303FDA029E}"/>
+              </a:ext>
+            </a:extLst>
+          </p:cNvPr>
+          <p:cNvPicPr>
+            <a:picLocks noChangeAspect="1"/>
+          </p:cNvPicPr>
+          <p:nvPr/>
+        </p:nvPicPr>
+        <p:blipFill>
+          <a:blip r:embed="rId5"/>
+          <a:stretch>
+            <a:fillRect/>
+          </a:stretch>
+        </p:blipFill>
+        <p:spPr>
+          <a:xfrm>
+            <a:off x="5693230" y="4574870"/>
+            <a:ext cx="1837507" cy="381559"/>
+          </a:xfrm>
+          <a:prstGeom prst="rect">
+            <a:avLst/>
+          </a:prstGeom>
+        </p:spPr>
+      </p:pic>
+      <p:pic>
+        <p:nvPicPr>
+          <p:cNvPr id="11" name="Picture 10" descr="A black text on a white background&#10;&#10;AI-generated content may be incorrect.">
+            <a:extLst>
+              <a:ext uri="{FF2B5EF4-FFF2-40B4-BE49-F238E27FC236}">
+                <a16:creationId xmlns:a16="http://schemas.microsoft.com/office/drawing/2014/main" id="{FD02FED3-3C58-38B1-8351-EDF409388ED2}"/>
+              </a:ext>
+            </a:extLst>
+          </p:cNvPr>
+          <p:cNvPicPr>
+            <a:picLocks noChangeAspect="1"/>
+          </p:cNvPicPr>
+          <p:nvPr/>
+        </p:nvPicPr>
+        <p:blipFill>
+          <a:blip r:embed="rId6"/>
+          <a:stretch>
+            <a:fillRect/>
+          </a:stretch>
+        </p:blipFill>
+        <p:spPr>
+          <a:xfrm>
+            <a:off x="4634047" y="2640648"/>
+            <a:ext cx="457201" cy="1016001"/>
+          </a:xfrm>
+          <a:prstGeom prst="rect">
+            <a:avLst/>
+          </a:prstGeom>
+        </p:spPr>
+      </p:pic>
+      <p:sp>
+        <p:nvSpPr>
+          <p:cNvPr id="15" name="TextBox 14">
+            <a:extLst>
+              <a:ext uri="{FF2B5EF4-FFF2-40B4-BE49-F238E27FC236}">
+                <a16:creationId xmlns:a16="http://schemas.microsoft.com/office/drawing/2014/main" id="{1599232C-7A1F-1F48-9E21-76F0536605E3}"/>
+              </a:ext>
+            </a:extLst>
+          </p:cNvPr>
+          <p:cNvSpPr txBox="1"/>
+          <p:nvPr/>
+        </p:nvSpPr>
+        <p:spPr>
+          <a:xfrm>
+            <a:off x="5156160" y="3196046"/>
+            <a:ext cx="415833" cy="307777"/>
+          </a:xfrm>
+          <a:prstGeom prst="rect">
+            <a:avLst/>
+          </a:prstGeom>
+          <a:noFill/>
+        </p:spPr>
+        <p:txBody>
+          <a:bodyPr wrap="square" rtlCol="0">
+            <a:spAutoFit/>
+          </a:bodyPr>
+          <a:lstStyle/>
+          <a:p>
+            <a:r>
+              <a:rPr lang="en-US" sz="1400" dirty="0"/>
+              <a:t>r</a:t>
+            </a:r>
+            <a:r>
+              <a:rPr lang="en-US" sz="1400" baseline="-25000" dirty="0"/>
+              <a:t>a</a:t>
+            </a:r>
+            <a:endParaRPr lang="en-US" sz="1400" dirty="0"/>
+          </a:p>
+        </p:txBody>
+      </p:sp>
+      <p:sp>
+        <p:nvSpPr>
+          <p:cNvPr id="16" name="TextBox 15">
+            <a:extLst>
+              <a:ext uri="{FF2B5EF4-FFF2-40B4-BE49-F238E27FC236}">
+                <a16:creationId xmlns:a16="http://schemas.microsoft.com/office/drawing/2014/main" id="{44FDFD56-88C1-C84C-D01F-B85EA5FD2B15}"/>
+              </a:ext>
+            </a:extLst>
+          </p:cNvPr>
+          <p:cNvSpPr txBox="1"/>
+          <p:nvPr/>
+        </p:nvSpPr>
+        <p:spPr>
+          <a:xfrm>
+            <a:off x="5171209" y="3760860"/>
+            <a:ext cx="415833" cy="307777"/>
+          </a:xfrm>
+          <a:prstGeom prst="rect">
+            <a:avLst/>
+          </a:prstGeom>
+          <a:noFill/>
+        </p:spPr>
+        <p:txBody>
+          <a:bodyPr wrap="square" rtlCol="0">
+            <a:spAutoFit/>
+          </a:bodyPr>
+          <a:lstStyle/>
+          <a:p>
+            <a:r>
+              <a:rPr lang="en-US" sz="1400" dirty="0"/>
+              <a:t>r</a:t>
+            </a:r>
+            <a:r>
+              <a:rPr lang="en-US" sz="1400" baseline="-25000" dirty="0"/>
+              <a:t>b</a:t>
+            </a:r>
+            <a:endParaRPr lang="en-US" sz="1400" dirty="0"/>
+          </a:p>
+        </p:txBody>
+      </p:sp>
+      <p:cxnSp>
+        <p:nvCxnSpPr>
+          <p:cNvPr id="18" name="Straight Arrow Connector 17">
+            <a:extLst>
+              <a:ext uri="{FF2B5EF4-FFF2-40B4-BE49-F238E27FC236}">
+                <a16:creationId xmlns:a16="http://schemas.microsoft.com/office/drawing/2014/main" id="{54980B91-232E-AE50-0E9D-6C2CA3A2C392}"/>
+              </a:ext>
+            </a:extLst>
+          </p:cNvPr>
+          <p:cNvCxnSpPr>
+            <a:cxnSpLocks/>
+          </p:cNvCxnSpPr>
+          <p:nvPr/>
+        </p:nvCxnSpPr>
+        <p:spPr>
+          <a:xfrm flipV="1">
+            <a:off x="5670462" y="3328607"/>
+            <a:ext cx="502824" cy="328042"/>
+          </a:xfrm>
+          <a:prstGeom prst="straightConnector1">
+            <a:avLst/>
+          </a:prstGeom>
+          <a:ln>
+            <a:solidFill>
+              <a:srgbClr val="1D86EE"/>
+            </a:solidFill>
+            <a:tailEnd type="triangle"/>
+          </a:ln>
+        </p:spPr>
+        <p:style>
+          <a:lnRef idx="2">
+            <a:schemeClr val="accent1"/>
+          </a:lnRef>
+          <a:fillRef idx="0">
+            <a:schemeClr val="accent1"/>
+          </a:fillRef>
+          <a:effectRef idx="1">
+            <a:schemeClr val="accent1"/>
+          </a:effectRef>
+          <a:fontRef idx="minor">
+            <a:schemeClr val="tx1"/>
+          </a:fontRef>
+        </p:style>
+      </p:cxnSp>
+      <p:sp>
+        <p:nvSpPr>
+          <p:cNvPr id="19" name="TextBox 18">
+            <a:extLst>
+              <a:ext uri="{FF2B5EF4-FFF2-40B4-BE49-F238E27FC236}">
+                <a16:creationId xmlns:a16="http://schemas.microsoft.com/office/drawing/2014/main" id="{6D07C209-1B60-0389-353E-3AC7CA0959B8}"/>
+              </a:ext>
+            </a:extLst>
+          </p:cNvPr>
+          <p:cNvSpPr txBox="1"/>
+          <p:nvPr/>
+        </p:nvSpPr>
+        <p:spPr>
+          <a:xfrm>
+            <a:off x="5801885" y="3492628"/>
+            <a:ext cx="588229" cy="276999"/>
+          </a:xfrm>
+          <a:prstGeom prst="rect">
+            <a:avLst/>
+          </a:prstGeom>
+          <a:noFill/>
+        </p:spPr>
+        <p:txBody>
+          <a:bodyPr wrap="square" rtlCol="0">
+            <a:spAutoFit/>
+          </a:bodyPr>
+          <a:lstStyle/>
+          <a:p>
+            <a:r>
+              <a:rPr lang="en-US" sz="1200" dirty="0"/>
+              <a:t>E</a:t>
+            </a:r>
+            <a:r>
+              <a:rPr lang="en-US" sz="1200" baseline="-25000" dirty="0"/>
+              <a:t>rb</a:t>
+            </a:r>
+            <a:endParaRPr lang="en-US" sz="1200" dirty="0"/>
+          </a:p>
+        </p:txBody>
+      </p:sp>
+      <p:cxnSp>
+        <p:nvCxnSpPr>
+          <p:cNvPr id="21" name="Straight Arrow Connector 20">
+            <a:extLst>
+              <a:ext uri="{FF2B5EF4-FFF2-40B4-BE49-F238E27FC236}">
+                <a16:creationId xmlns:a16="http://schemas.microsoft.com/office/drawing/2014/main" id="{01E19F28-2AFC-D3BD-997D-F851A5AB766C}"/>
+              </a:ext>
+            </a:extLst>
+          </p:cNvPr>
+          <p:cNvCxnSpPr>
+            <a:cxnSpLocks/>
+          </p:cNvCxnSpPr>
+          <p:nvPr/>
+        </p:nvCxnSpPr>
+        <p:spPr>
+          <a:xfrm flipV="1">
+            <a:off x="5647343" y="3003468"/>
+            <a:ext cx="588229" cy="268383"/>
+          </a:xfrm>
+          <a:prstGeom prst="straightConnector1">
+            <a:avLst/>
+          </a:prstGeom>
+          <a:ln>
+            <a:solidFill>
+              <a:srgbClr val="003D88"/>
+            </a:solidFill>
+            <a:tailEnd type="triangle"/>
+          </a:ln>
+        </p:spPr>
+        <p:style>
+          <a:lnRef idx="2">
+            <a:schemeClr val="accent1"/>
+          </a:lnRef>
+          <a:fillRef idx="0">
+            <a:schemeClr val="accent1"/>
+          </a:fillRef>
+          <a:effectRef idx="1">
+            <a:schemeClr val="accent1"/>
+          </a:effectRef>
+          <a:fontRef idx="minor">
+            <a:schemeClr val="tx1"/>
+          </a:fontRef>
+        </p:style>
+      </p:cxnSp>
+      <p:sp>
+        <p:nvSpPr>
+          <p:cNvPr id="23" name="TextBox 22">
+            <a:extLst>
+              <a:ext uri="{FF2B5EF4-FFF2-40B4-BE49-F238E27FC236}">
+                <a16:creationId xmlns:a16="http://schemas.microsoft.com/office/drawing/2014/main" id="{3A951EE5-37DC-DEB2-A846-F3F39C5E38C3}"/>
+              </a:ext>
+            </a:extLst>
+          </p:cNvPr>
+          <p:cNvSpPr txBox="1"/>
+          <p:nvPr/>
+        </p:nvSpPr>
+        <p:spPr>
+          <a:xfrm>
+            <a:off x="5636906" y="2874576"/>
+            <a:ext cx="588229" cy="276999"/>
+          </a:xfrm>
+          <a:prstGeom prst="rect">
+            <a:avLst/>
+          </a:prstGeom>
+          <a:noFill/>
+        </p:spPr>
+        <p:txBody>
+          <a:bodyPr wrap="square" rtlCol="0">
+            <a:spAutoFit/>
+          </a:bodyPr>
+          <a:lstStyle/>
+          <a:p>
+            <a:r>
+              <a:rPr lang="en-US" sz="1200" dirty="0"/>
+              <a:t>E</a:t>
+            </a:r>
+            <a:r>
+              <a:rPr lang="en-US" sz="1200" baseline="-25000" dirty="0"/>
+              <a:t>ra</a:t>
+            </a:r>
+            <a:endParaRPr lang="en-US" sz="1200" dirty="0"/>
+          </a:p>
+        </p:txBody>
+      </p:sp>
+    </p:spTree>
+    <p:extLst>
+      <p:ext uri="{BB962C8B-B14F-4D97-AF65-F5344CB8AC3E}">
+        <p14:creationId xmlns:p14="http://schemas.microsoft.com/office/powerpoint/2010/main" val="1742207764"/>
       </p:ext>
     </p:extLst>
   </p:cSld>
@@ -9237,12 +9283,64 @@
           <a:chExt cx="0" cy="0"/>
         </a:xfrm>
       </p:grpSpPr>
+      <p:sp>
+        <p:nvSpPr>
+          <p:cNvPr id="8" name="Rectangle 7">
+            <a:extLst>
+              <a:ext uri="{FF2B5EF4-FFF2-40B4-BE49-F238E27FC236}">
+                <a16:creationId xmlns:a16="http://schemas.microsoft.com/office/drawing/2014/main" id="{12B968FB-051A-8BB9-D2A6-564E5C1E67B5}"/>
+              </a:ext>
+            </a:extLst>
+          </p:cNvPr>
+          <p:cNvSpPr/>
+          <p:nvPr/>
+        </p:nvSpPr>
+        <p:spPr>
+          <a:xfrm>
+            <a:off x="5629619" y="5288098"/>
+            <a:ext cx="1410159" cy="382836"/>
+          </a:xfrm>
+          <a:prstGeom prst="rect">
+            <a:avLst/>
+          </a:prstGeom>
+          <a:solidFill>
+            <a:schemeClr val="bg1"/>
+          </a:solidFill>
+          <a:ln>
+            <a:noFill/>
+          </a:ln>
+        </p:spPr>
+        <p:style>
+          <a:lnRef idx="2">
+            <a:schemeClr val="accent1">
+              <a:shade val="15000"/>
+            </a:schemeClr>
+          </a:lnRef>
+          <a:fillRef idx="1">
+            <a:schemeClr val="accent1"/>
+          </a:fillRef>
+          <a:effectRef idx="0">
+            <a:schemeClr val="accent1"/>
+          </a:effectRef>
+          <a:fontRef idx="minor">
+            <a:schemeClr val="lt1"/>
+          </a:fontRef>
+        </p:style>
+        <p:txBody>
+          <a:bodyPr rtlCol="0" anchor="ctr"/>
+          <a:lstStyle/>
+          <a:p>
+            <a:pPr algn="ctr"/>
+            <a:endParaRPr lang="en-US"/>
+          </a:p>
+        </p:txBody>
+      </p:sp>
       <p:pic>
         <p:nvPicPr>
-          <p:cNvPr id="5" name="Picture 4">
-            <a:extLst>
-              <a:ext uri="{FF2B5EF4-FFF2-40B4-BE49-F238E27FC236}">
-                <a16:creationId xmlns:a16="http://schemas.microsoft.com/office/drawing/2014/main" id="{9F42E330-4C9C-5FF7-86F1-1FFE0DCAE1DF}"/>
+          <p:cNvPr id="14" name="Picture 13">
+            <a:extLst>
+              <a:ext uri="{FF2B5EF4-FFF2-40B4-BE49-F238E27FC236}">
+                <a16:creationId xmlns:a16="http://schemas.microsoft.com/office/drawing/2014/main" id="{3A698699-D119-0F63-39E4-6FB504F70999}"/>
               </a:ext>
             </a:extLst>
           </p:cNvPr>
@@ -9253,25 +9351,167 @@
         </p:nvPicPr>
         <p:blipFill>
           <a:blip r:embed="rId2"/>
-          <a:srcRect l="1850" r="3796"/>
+          <a:srcRect t="4669" b="4669"/>
           <a:stretch/>
         </p:blipFill>
         <p:spPr>
           <a:xfrm>
-            <a:off x="157164" y="1499919"/>
-            <a:ext cx="4260056" cy="3391344"/>
+            <a:off x="2438400" y="1143000"/>
+            <a:ext cx="7315200" cy="4145098"/>
           </a:xfrm>
           <a:prstGeom prst="rect">
             <a:avLst/>
           </a:prstGeom>
         </p:spPr>
       </p:pic>
+      <p:sp>
+        <p:nvSpPr>
+          <p:cNvPr id="10" name="TextBox 9">
+            <a:extLst>
+              <a:ext uri="{FF2B5EF4-FFF2-40B4-BE49-F238E27FC236}">
+                <a16:creationId xmlns:a16="http://schemas.microsoft.com/office/drawing/2014/main" id="{C5BC6916-1A0B-E0E5-2DCF-7578FA0A2244}"/>
+              </a:ext>
+            </a:extLst>
+          </p:cNvPr>
+          <p:cNvSpPr txBox="1"/>
+          <p:nvPr/>
+        </p:nvSpPr>
+        <p:spPr>
+          <a:xfrm>
+            <a:off x="7656722" y="1942189"/>
+            <a:ext cx="829935" cy="523220"/>
+          </a:xfrm>
+          <a:prstGeom prst="rect">
+            <a:avLst/>
+          </a:prstGeom>
+          <a:noFill/>
+        </p:spPr>
+        <p:txBody>
+          <a:bodyPr wrap="square" rtlCol="0">
+            <a:spAutoFit/>
+          </a:bodyPr>
+          <a:lstStyle/>
+          <a:p>
+            <a:r>
+              <a:rPr lang="en-US" sz="2800" dirty="0"/>
+              <a:t>N</a:t>
+            </a:r>
+            <a:r>
+              <a:rPr lang="en-US" sz="2800" baseline="-25000" dirty="0"/>
+              <a:t>1</a:t>
+            </a:r>
+          </a:p>
+        </p:txBody>
+      </p:sp>
+      <p:sp>
+        <p:nvSpPr>
+          <p:cNvPr id="11" name="TextBox 10">
+            <a:extLst>
+              <a:ext uri="{FF2B5EF4-FFF2-40B4-BE49-F238E27FC236}">
+                <a16:creationId xmlns:a16="http://schemas.microsoft.com/office/drawing/2014/main" id="{F9A75A65-887D-0DC9-8D6E-79C38E0D5083}"/>
+              </a:ext>
+            </a:extLst>
+          </p:cNvPr>
+          <p:cNvSpPr txBox="1"/>
+          <p:nvPr/>
+        </p:nvSpPr>
+        <p:spPr>
+          <a:xfrm>
+            <a:off x="4439798" y="1942189"/>
+            <a:ext cx="829935" cy="523220"/>
+          </a:xfrm>
+          <a:prstGeom prst="rect">
+            <a:avLst/>
+          </a:prstGeom>
+          <a:noFill/>
+        </p:spPr>
+        <p:txBody>
+          <a:bodyPr wrap="square" rtlCol="0">
+            <a:spAutoFit/>
+          </a:bodyPr>
+          <a:lstStyle/>
+          <a:p>
+            <a:r>
+              <a:rPr lang="en-US" sz="2800" dirty="0">
+                <a:solidFill>
+                  <a:schemeClr val="bg2">
+                    <a:lumMod val="50000"/>
+                  </a:schemeClr>
+                </a:solidFill>
+              </a:rPr>
+              <a:t>N</a:t>
+            </a:r>
+            <a:r>
+              <a:rPr lang="en-US" sz="2800" baseline="-25000" dirty="0">
+                <a:solidFill>
+                  <a:schemeClr val="bg2">
+                    <a:lumMod val="50000"/>
+                  </a:schemeClr>
+                </a:solidFill>
+              </a:rPr>
+              <a:t>2</a:t>
+            </a:r>
+          </a:p>
+        </p:txBody>
+      </p:sp>
+      <p:sp>
+        <p:nvSpPr>
+          <p:cNvPr id="16" name="Rectangle 15">
+            <a:extLst>
+              <a:ext uri="{FF2B5EF4-FFF2-40B4-BE49-F238E27FC236}">
+                <a16:creationId xmlns:a16="http://schemas.microsoft.com/office/drawing/2014/main" id="{FD6E67F3-947B-5167-C2F9-9463A2808D2E}"/>
+              </a:ext>
+            </a:extLst>
+          </p:cNvPr>
+          <p:cNvSpPr/>
+          <p:nvPr/>
+        </p:nvSpPr>
+        <p:spPr>
+          <a:xfrm>
+            <a:off x="5053073" y="4881851"/>
+            <a:ext cx="2603649" cy="385592"/>
+          </a:xfrm>
+          <a:prstGeom prst="rect">
+            <a:avLst/>
+          </a:prstGeom>
+          <a:solidFill>
+            <a:schemeClr val="bg1"/>
+          </a:solidFill>
+          <a:ln>
+            <a:noFill/>
+          </a:ln>
+        </p:spPr>
+        <p:style>
+          <a:lnRef idx="2">
+            <a:schemeClr val="accent1">
+              <a:shade val="15000"/>
+            </a:schemeClr>
+          </a:lnRef>
+          <a:fillRef idx="1">
+            <a:schemeClr val="accent1"/>
+          </a:fillRef>
+          <a:effectRef idx="0">
+            <a:schemeClr val="accent1"/>
+          </a:effectRef>
+          <a:fontRef idx="minor">
+            <a:schemeClr val="lt1"/>
+          </a:fontRef>
+        </p:style>
+        <p:txBody>
+          <a:bodyPr rtlCol="0" anchor="ctr"/>
+          <a:lstStyle/>
+          <a:p>
+            <a:pPr algn="ctr"/>
+            <a:endParaRPr lang="en-US"/>
+          </a:p>
+        </p:txBody>
+      </p:sp>
       <p:pic>
         <p:nvPicPr>
-          <p:cNvPr id="6" name="Picture 5">
-            <a:extLst>
-              <a:ext uri="{FF2B5EF4-FFF2-40B4-BE49-F238E27FC236}">
-                <a16:creationId xmlns:a16="http://schemas.microsoft.com/office/drawing/2014/main" id="{58DF6D50-0003-9D90-89CD-A7A95C592D66}"/>
+          <p:cNvPr id="17" name="Picture 16">
+            <a:extLst>
+              <a:ext uri="{FF2B5EF4-FFF2-40B4-BE49-F238E27FC236}">
+                <a16:creationId xmlns:a16="http://schemas.microsoft.com/office/drawing/2014/main" id="{361E9060-8701-5BD4-3B33-E25FBA33BC35}"/>
               </a:ext>
             </a:extLst>
           </p:cNvPr>
@@ -9282,250 +9522,43 @@
         </p:nvPicPr>
         <p:blipFill>
           <a:blip r:embed="rId3"/>
-          <a:srcRect l="1900" r="1900"/>
+          <a:srcRect l="33108" t="86836" r="27586" b="4729"/>
           <a:stretch/>
         </p:blipFill>
         <p:spPr>
           <a:xfrm>
-            <a:off x="8512563" y="1604328"/>
-            <a:ext cx="3383345" cy="3589223"/>
+            <a:off x="4909393" y="5615470"/>
+            <a:ext cx="2875402" cy="385592"/>
           </a:xfrm>
           <a:prstGeom prst="rect">
             <a:avLst/>
           </a:prstGeom>
         </p:spPr>
       </p:pic>
-      <p:sp>
-        <p:nvSpPr>
-          <p:cNvPr id="7" name="TextBox 6">
-            <a:extLst>
-              <a:ext uri="{FF2B5EF4-FFF2-40B4-BE49-F238E27FC236}">
-                <a16:creationId xmlns:a16="http://schemas.microsoft.com/office/drawing/2014/main" id="{4F2FEA2F-D331-4DDD-9F3C-D7F39F3D33E2}"/>
-              </a:ext>
-            </a:extLst>
-          </p:cNvPr>
-          <p:cNvSpPr txBox="1"/>
-          <p:nvPr/>
-        </p:nvSpPr>
-        <p:spPr>
-          <a:xfrm>
-            <a:off x="3275084" y="495827"/>
-            <a:ext cx="4714369" cy="461665"/>
-          </a:xfrm>
-          <a:prstGeom prst="rect">
-            <a:avLst/>
-          </a:prstGeom>
-          <a:noFill/>
-        </p:spPr>
-        <p:txBody>
-          <a:bodyPr wrap="square" rtlCol="0">
-            <a:spAutoFit/>
-          </a:bodyPr>
-          <a:lstStyle/>
-          <a:p>
-            <a:r>
-              <a:rPr lang="en-US" sz="2400" dirty="0"/>
-              <a:t>Intra-process thermal asymmetry</a:t>
-            </a:r>
-          </a:p>
-        </p:txBody>
-      </p:sp>
-      <p:pic>
-        <p:nvPicPr>
-          <p:cNvPr id="9" name="Picture 8">
-            <a:extLst>
-              <a:ext uri="{FF2B5EF4-FFF2-40B4-BE49-F238E27FC236}">
-                <a16:creationId xmlns:a16="http://schemas.microsoft.com/office/drawing/2014/main" id="{9B1CBAB2-8000-6026-E623-397D34194199}"/>
-              </a:ext>
-            </a:extLst>
-          </p:cNvPr>
-          <p:cNvPicPr>
-            <a:picLocks noChangeAspect="1"/>
-          </p:cNvPicPr>
-          <p:nvPr/>
-        </p:nvPicPr>
-        <p:blipFill>
-          <a:blip r:embed="rId4"/>
-          <a:srcRect t="6370"/>
-          <a:stretch/>
-        </p:blipFill>
-        <p:spPr>
-          <a:xfrm>
-            <a:off x="4820059" y="1762735"/>
-            <a:ext cx="3326673" cy="3114762"/>
-          </a:xfrm>
-          <a:prstGeom prst="rect">
-            <a:avLst/>
-          </a:prstGeom>
-        </p:spPr>
-      </p:pic>
-      <p:pic>
-        <p:nvPicPr>
-          <p:cNvPr id="10" name="Picture 9" descr="A black text on a white background&#10;&#10;AI-generated content may be incorrect.">
-            <a:extLst>
-              <a:ext uri="{FF2B5EF4-FFF2-40B4-BE49-F238E27FC236}">
-                <a16:creationId xmlns:a16="http://schemas.microsoft.com/office/drawing/2014/main" id="{E2EBAB9A-D4FC-0920-24BD-F9303FDA029E}"/>
-              </a:ext>
-            </a:extLst>
-          </p:cNvPr>
-          <p:cNvPicPr>
-            <a:picLocks noChangeAspect="1"/>
-          </p:cNvPicPr>
-          <p:nvPr/>
-        </p:nvPicPr>
-        <p:blipFill>
-          <a:blip r:embed="rId5"/>
-          <a:stretch>
-            <a:fillRect/>
-          </a:stretch>
-        </p:blipFill>
-        <p:spPr>
-          <a:xfrm>
-            <a:off x="5693230" y="4574870"/>
-            <a:ext cx="1837507" cy="381559"/>
-          </a:xfrm>
-          <a:prstGeom prst="rect">
-            <a:avLst/>
-          </a:prstGeom>
-        </p:spPr>
-      </p:pic>
-      <p:pic>
-        <p:nvPicPr>
-          <p:cNvPr id="11" name="Picture 10" descr="A black text on a white background&#10;&#10;AI-generated content may be incorrect.">
-            <a:extLst>
-              <a:ext uri="{FF2B5EF4-FFF2-40B4-BE49-F238E27FC236}">
-                <a16:creationId xmlns:a16="http://schemas.microsoft.com/office/drawing/2014/main" id="{FD02FED3-3C58-38B1-8351-EDF409388ED2}"/>
-              </a:ext>
-            </a:extLst>
-          </p:cNvPr>
-          <p:cNvPicPr>
-            <a:picLocks noChangeAspect="1"/>
-          </p:cNvPicPr>
-          <p:nvPr/>
-        </p:nvPicPr>
-        <p:blipFill>
-          <a:blip r:embed="rId6"/>
-          <a:stretch>
-            <a:fillRect/>
-          </a:stretch>
-        </p:blipFill>
-        <p:spPr>
-          <a:xfrm>
-            <a:off x="4634047" y="2640648"/>
-            <a:ext cx="457201" cy="1016001"/>
-          </a:xfrm>
-          <a:prstGeom prst="rect">
-            <a:avLst/>
-          </a:prstGeom>
-        </p:spPr>
-      </p:pic>
-      <p:sp>
-        <p:nvSpPr>
-          <p:cNvPr id="15" name="TextBox 14">
-            <a:extLst>
-              <a:ext uri="{FF2B5EF4-FFF2-40B4-BE49-F238E27FC236}">
-                <a16:creationId xmlns:a16="http://schemas.microsoft.com/office/drawing/2014/main" id="{1599232C-7A1F-1F48-9E21-76F0536605E3}"/>
-              </a:ext>
-            </a:extLst>
-          </p:cNvPr>
-          <p:cNvSpPr txBox="1"/>
-          <p:nvPr/>
-        </p:nvSpPr>
-        <p:spPr>
-          <a:xfrm>
-            <a:off x="5156160" y="3196046"/>
-            <a:ext cx="415833" cy="307777"/>
-          </a:xfrm>
-          <a:prstGeom prst="rect">
-            <a:avLst/>
-          </a:prstGeom>
-          <a:noFill/>
-        </p:spPr>
-        <p:txBody>
-          <a:bodyPr wrap="square" rtlCol="0">
-            <a:spAutoFit/>
-          </a:bodyPr>
-          <a:lstStyle/>
-          <a:p>
-            <a:r>
-              <a:rPr lang="en-US" sz="1400" dirty="0"/>
-              <a:t>r</a:t>
-            </a:r>
-            <a:r>
-              <a:rPr lang="en-US" sz="1400" baseline="-25000" dirty="0"/>
-              <a:t>a</a:t>
-            </a:r>
-            <a:endParaRPr lang="en-US" sz="1400" dirty="0"/>
-          </a:p>
-        </p:txBody>
-      </p:sp>
-      <p:sp>
-        <p:nvSpPr>
-          <p:cNvPr id="16" name="TextBox 15">
-            <a:extLst>
-              <a:ext uri="{FF2B5EF4-FFF2-40B4-BE49-F238E27FC236}">
-                <a16:creationId xmlns:a16="http://schemas.microsoft.com/office/drawing/2014/main" id="{44FDFD56-88C1-C84C-D01F-B85EA5FD2B15}"/>
-              </a:ext>
-            </a:extLst>
-          </p:cNvPr>
-          <p:cNvSpPr txBox="1"/>
-          <p:nvPr/>
-        </p:nvSpPr>
-        <p:spPr>
-          <a:xfrm>
-            <a:off x="5171209" y="3760860"/>
-            <a:ext cx="415833" cy="307777"/>
-          </a:xfrm>
-          <a:prstGeom prst="rect">
-            <a:avLst/>
-          </a:prstGeom>
-          <a:noFill/>
-        </p:spPr>
-        <p:txBody>
-          <a:bodyPr wrap="square" rtlCol="0">
-            <a:spAutoFit/>
-          </a:bodyPr>
-          <a:lstStyle/>
-          <a:p>
-            <a:r>
-              <a:rPr lang="en-US" sz="1400" dirty="0"/>
-              <a:t>r</a:t>
-            </a:r>
-            <a:r>
-              <a:rPr lang="en-US" sz="1400" baseline="-25000" dirty="0"/>
-              <a:t>b</a:t>
-            </a:r>
-            <a:endParaRPr lang="en-US" sz="1400" dirty="0"/>
-          </a:p>
-        </p:txBody>
-      </p:sp>
       <p:cxnSp>
         <p:nvCxnSpPr>
-          <p:cNvPr id="18" name="Straight Arrow Connector 17">
-            <a:extLst>
-              <a:ext uri="{FF2B5EF4-FFF2-40B4-BE49-F238E27FC236}">
-                <a16:creationId xmlns:a16="http://schemas.microsoft.com/office/drawing/2014/main" id="{54980B91-232E-AE50-0E9D-6C2CA3A2C392}"/>
-              </a:ext>
-            </a:extLst>
-          </p:cNvPr>
-          <p:cNvCxnSpPr>
-            <a:cxnSpLocks/>
-          </p:cNvCxnSpPr>
+          <p:cNvPr id="21" name="Straight Connector 20">
+            <a:extLst>
+              <a:ext uri="{FF2B5EF4-FFF2-40B4-BE49-F238E27FC236}">
+                <a16:creationId xmlns:a16="http://schemas.microsoft.com/office/drawing/2014/main" id="{4E2E1F08-9890-6DA4-349C-6EAA91715BA7}"/>
+              </a:ext>
+            </a:extLst>
+          </p:cNvPr>
+          <p:cNvCxnSpPr/>
           <p:nvPr/>
         </p:nvCxnSpPr>
         <p:spPr>
-          <a:xfrm flipV="1">
-            <a:off x="5670462" y="3328607"/>
-            <a:ext cx="502824" cy="328042"/>
-          </a:xfrm>
-          <a:prstGeom prst="straightConnector1">
-            <a:avLst/>
-          </a:prstGeom>
-          <a:ln>
+          <a:xfrm>
+            <a:off x="3711763" y="4678728"/>
+            <a:ext cx="1" cy="203123"/>
+          </a:xfrm>
+          <a:prstGeom prst="line">
+            <a:avLst/>
+          </a:prstGeom>
+          <a:ln w="38100">
             <a:solidFill>
-              <a:srgbClr val="1D86EE"/>
+              <a:schemeClr val="tx1"/>
             </a:solidFill>
-            <a:tailEnd type="triangle"/>
           </a:ln>
         </p:spPr>
         <p:style>
@@ -9545,10 +9578,10 @@
       </p:cxnSp>
       <p:sp>
         <p:nvSpPr>
-          <p:cNvPr id="19" name="TextBox 18">
-            <a:extLst>
-              <a:ext uri="{FF2B5EF4-FFF2-40B4-BE49-F238E27FC236}">
-                <a16:creationId xmlns:a16="http://schemas.microsoft.com/office/drawing/2014/main" id="{6D07C209-1B60-0389-353E-3AC7CA0959B8}"/>
+          <p:cNvPr id="22" name="TextBox 21">
+            <a:extLst>
+              <a:ext uri="{FF2B5EF4-FFF2-40B4-BE49-F238E27FC236}">
+                <a16:creationId xmlns:a16="http://schemas.microsoft.com/office/drawing/2014/main" id="{1C60EE13-FF9F-01C6-5158-AC916D94E30C}"/>
               </a:ext>
             </a:extLst>
           </p:cNvPr>
@@ -9557,8 +9590,8 @@
         </p:nvSpPr>
         <p:spPr>
           <a:xfrm>
-            <a:off x="5801885" y="3492628"/>
-            <a:ext cx="588229" cy="276999"/>
+            <a:off x="5048026" y="4929094"/>
+            <a:ext cx="2783590" cy="369332"/>
           </a:xfrm>
           <a:prstGeom prst="rect">
             <a:avLst/>
@@ -9571,45 +9604,79 @@
           </a:bodyPr>
           <a:lstStyle/>
           <a:p>
-            <a:r>
-              <a:rPr lang="en-US" sz="1200" dirty="0"/>
-              <a:t>E</a:t>
-            </a:r>
-            <a:r>
-              <a:rPr lang="en-US" sz="1200" baseline="-25000" dirty="0"/>
-              <a:t>rb</a:t>
-            </a:r>
-            <a:endParaRPr lang="en-US" sz="1200" dirty="0"/>
+            <a:pPr algn="ctr"/>
+            <a:r>
+              <a:rPr lang="en-US" dirty="0"/>
+              <a:t>No resource preference</a:t>
+            </a:r>
+            <a:endParaRPr lang="en-US" i="1" dirty="0"/>
+          </a:p>
+        </p:txBody>
+      </p:sp>
+      <p:sp>
+        <p:nvSpPr>
+          <p:cNvPr id="23" name="TextBox 22">
+            <a:extLst>
+              <a:ext uri="{FF2B5EF4-FFF2-40B4-BE49-F238E27FC236}">
+                <a16:creationId xmlns:a16="http://schemas.microsoft.com/office/drawing/2014/main" id="{85325CFB-2756-2900-0451-D59FC859AAEC}"/>
+              </a:ext>
+            </a:extLst>
+          </p:cNvPr>
+          <p:cNvSpPr txBox="1"/>
+          <p:nvPr/>
+        </p:nvSpPr>
+        <p:spPr>
+          <a:xfrm>
+            <a:off x="2962617" y="4895590"/>
+            <a:ext cx="1566239" cy="923330"/>
+          </a:xfrm>
+          <a:prstGeom prst="rect">
+            <a:avLst/>
+          </a:prstGeom>
+          <a:noFill/>
+        </p:spPr>
+        <p:txBody>
+          <a:bodyPr wrap="square" rtlCol="0">
+            <a:spAutoFit/>
+          </a:bodyPr>
+          <a:lstStyle/>
+          <a:p>
+            <a:pPr algn="ctr"/>
+            <a:r>
+              <a:rPr lang="en-US" dirty="0"/>
+              <a:t>100% specialization on resource</a:t>
+            </a:r>
+            <a:r>
+              <a:rPr lang="en-US" i="1" dirty="0"/>
+              <a:t> a</a:t>
+            </a:r>
           </a:p>
         </p:txBody>
       </p:sp>
       <p:cxnSp>
         <p:nvCxnSpPr>
-          <p:cNvPr id="21" name="Straight Arrow Connector 20">
-            <a:extLst>
-              <a:ext uri="{FF2B5EF4-FFF2-40B4-BE49-F238E27FC236}">
-                <a16:creationId xmlns:a16="http://schemas.microsoft.com/office/drawing/2014/main" id="{01E19F28-2AFC-D3BD-997D-F851A5AB766C}"/>
-              </a:ext>
-            </a:extLst>
-          </p:cNvPr>
-          <p:cNvCxnSpPr>
-            <a:cxnSpLocks/>
-          </p:cNvCxnSpPr>
+          <p:cNvPr id="26" name="Straight Connector 25">
+            <a:extLst>
+              <a:ext uri="{FF2B5EF4-FFF2-40B4-BE49-F238E27FC236}">
+                <a16:creationId xmlns:a16="http://schemas.microsoft.com/office/drawing/2014/main" id="{2983F318-6967-1CB4-0ADD-33499F14101F}"/>
+              </a:ext>
+            </a:extLst>
+          </p:cNvPr>
+          <p:cNvCxnSpPr/>
           <p:nvPr/>
         </p:nvCxnSpPr>
         <p:spPr>
-          <a:xfrm flipV="1">
-            <a:off x="5647343" y="3003468"/>
-            <a:ext cx="588229" cy="268383"/>
-          </a:xfrm>
-          <a:prstGeom prst="straightConnector1">
-            <a:avLst/>
-          </a:prstGeom>
-          <a:ln>
+          <a:xfrm>
+            <a:off x="9099933" y="4678728"/>
+            <a:ext cx="1" cy="203123"/>
+          </a:xfrm>
+          <a:prstGeom prst="line">
+            <a:avLst/>
+          </a:prstGeom>
+          <a:ln w="38100">
             <a:solidFill>
-              <a:srgbClr val="003D88"/>
+              <a:schemeClr val="tx1"/>
             </a:solidFill>
-            <a:tailEnd type="triangle"/>
           </a:ln>
         </p:spPr>
         <p:style>
@@ -9629,10 +9696,10 @@
       </p:cxnSp>
       <p:sp>
         <p:nvSpPr>
-          <p:cNvPr id="23" name="TextBox 22">
-            <a:extLst>
-              <a:ext uri="{FF2B5EF4-FFF2-40B4-BE49-F238E27FC236}">
-                <a16:creationId xmlns:a16="http://schemas.microsoft.com/office/drawing/2014/main" id="{3A951EE5-37DC-DEB2-A846-F3F39C5E38C3}"/>
+          <p:cNvPr id="27" name="TextBox 26">
+            <a:extLst>
+              <a:ext uri="{FF2B5EF4-FFF2-40B4-BE49-F238E27FC236}">
+                <a16:creationId xmlns:a16="http://schemas.microsoft.com/office/drawing/2014/main" id="{4DA018AB-A51D-AA62-7CEB-AF0147E1DA42}"/>
               </a:ext>
             </a:extLst>
           </p:cNvPr>
@@ -9641,8 +9708,8 @@
         </p:nvSpPr>
         <p:spPr>
           <a:xfrm>
-            <a:off x="5636906" y="2874576"/>
-            <a:ext cx="588229" cy="276999"/>
+            <a:off x="8350787" y="4895590"/>
+            <a:ext cx="1566239" cy="923330"/>
           </a:xfrm>
           <a:prstGeom prst="rect">
             <a:avLst/>
@@ -9655,22 +9722,63 @@
           </a:bodyPr>
           <a:lstStyle/>
           <a:p>
-            <a:r>
-              <a:rPr lang="en-US" sz="1200" dirty="0"/>
-              <a:t>E</a:t>
-            </a:r>
-            <a:r>
-              <a:rPr lang="en-US" sz="1200" baseline="-25000" dirty="0"/>
-              <a:t>ra</a:t>
-            </a:r>
-            <a:endParaRPr lang="en-US" sz="1200" dirty="0"/>
-          </a:p>
-        </p:txBody>
-      </p:sp>
+            <a:pPr algn="ctr"/>
+            <a:r>
+              <a:rPr lang="en-US" dirty="0"/>
+              <a:t>100% specialization on resource</a:t>
+            </a:r>
+            <a:r>
+              <a:rPr lang="en-US" i="1" dirty="0"/>
+              <a:t> b</a:t>
+            </a:r>
+          </a:p>
+        </p:txBody>
+      </p:sp>
+      <p:cxnSp>
+        <p:nvCxnSpPr>
+          <p:cNvPr id="28" name="Straight Connector 27">
+            <a:extLst>
+              <a:ext uri="{FF2B5EF4-FFF2-40B4-BE49-F238E27FC236}">
+                <a16:creationId xmlns:a16="http://schemas.microsoft.com/office/drawing/2014/main" id="{C8AF9BC5-8ADC-3DB8-93F1-EE1F2AA874E0}"/>
+              </a:ext>
+            </a:extLst>
+          </p:cNvPr>
+          <p:cNvCxnSpPr/>
+          <p:nvPr/>
+        </p:nvCxnSpPr>
+        <p:spPr>
+          <a:xfrm>
+            <a:off x="6347094" y="4678653"/>
+            <a:ext cx="1" cy="203123"/>
+          </a:xfrm>
+          <a:prstGeom prst="line">
+            <a:avLst/>
+          </a:prstGeom>
+          <a:ln w="38100">
+            <a:solidFill>
+              <a:schemeClr val="tx1"/>
+            </a:solidFill>
+          </a:ln>
+        </p:spPr>
+        <p:style>
+          <a:lnRef idx="2">
+            <a:schemeClr val="accent1"/>
+          </a:lnRef>
+          <a:fillRef idx="0">
+            <a:schemeClr val="accent1"/>
+          </a:fillRef>
+          <a:effectRef idx="1">
+            <a:schemeClr val="accent1"/>
+          </a:effectRef>
+          <a:fontRef idx="minor">
+            <a:schemeClr val="tx1"/>
+          </a:fontRef>
+        </p:style>
+      </p:cxnSp>
     </p:spTree>
     <p:extLst>
       <p:ext uri="{BB962C8B-B14F-4D97-AF65-F5344CB8AC3E}">
-        <p14:creationId xmlns:p14="http://schemas.microsoft.com/office/powerpoint/2010/main" val="1742207764"/>
+        <p14:creationId xmlns:p14="http://schemas.microsoft.com/office/powerpoint/2010/main" val="4129822409"/>
       </p:ext>
     </p:extLst>
   </p:cSld>
@@ -9685,7 +9793,13 @@
   <p:cSld>
     <p:spTree>
       <p:nvGrpSpPr>
-        <p:cNvPr id="1" name=""/>
+        <p:cNvPr id="1" name="">
+          <a:extLst>
+            <a:ext uri="{FF2B5EF4-FFF2-40B4-BE49-F238E27FC236}">
+              <a16:creationId xmlns:a16="http://schemas.microsoft.com/office/drawing/2014/main" id="{E281B10D-3B0E-2860-401F-6EF061A3B56B}"/>
+            </a:ext>
+          </a:extLst>
+        </p:cNvPr>
         <p:cNvGrpSpPr/>
         <p:nvPr/>
       </p:nvGrpSpPr>
@@ -9697,12 +9811,64 @@
           <a:chExt cx="0" cy="0"/>
         </a:xfrm>
       </p:grpSpPr>
+      <p:sp>
+        <p:nvSpPr>
+          <p:cNvPr id="8" name="Rectangle 7">
+            <a:extLst>
+              <a:ext uri="{FF2B5EF4-FFF2-40B4-BE49-F238E27FC236}">
+                <a16:creationId xmlns:a16="http://schemas.microsoft.com/office/drawing/2014/main" id="{30EFA5D9-4527-CB97-96E0-F08BEAB0BF3E}"/>
+              </a:ext>
+            </a:extLst>
+          </p:cNvPr>
+          <p:cNvSpPr/>
+          <p:nvPr/>
+        </p:nvSpPr>
+        <p:spPr>
+          <a:xfrm>
+            <a:off x="5629619" y="5288098"/>
+            <a:ext cx="1410159" cy="382836"/>
+          </a:xfrm>
+          <a:prstGeom prst="rect">
+            <a:avLst/>
+          </a:prstGeom>
+          <a:solidFill>
+            <a:schemeClr val="bg1"/>
+          </a:solidFill>
+          <a:ln>
+            <a:noFill/>
+          </a:ln>
+        </p:spPr>
+        <p:style>
+          <a:lnRef idx="2">
+            <a:schemeClr val="accent1">
+              <a:shade val="15000"/>
+            </a:schemeClr>
+          </a:lnRef>
+          <a:fillRef idx="1">
+            <a:schemeClr val="accent1"/>
+          </a:fillRef>
+          <a:effectRef idx="0">
+            <a:schemeClr val="accent1"/>
+          </a:effectRef>
+          <a:fontRef idx="minor">
+            <a:schemeClr val="lt1"/>
+          </a:fontRef>
+        </p:style>
+        <p:txBody>
+          <a:bodyPr rtlCol="0" anchor="ctr"/>
+          <a:lstStyle/>
+          <a:p>
+            <a:pPr algn="ctr"/>
+            <a:endParaRPr lang="en-US"/>
+          </a:p>
+        </p:txBody>
+      </p:sp>
       <p:pic>
         <p:nvPicPr>
-          <p:cNvPr id="5" name="Picture 4" descr="A black background with a black square&#10;&#10;AI-generated content may be incorrect.">
-            <a:extLst>
-              <a:ext uri="{FF2B5EF4-FFF2-40B4-BE49-F238E27FC236}">
-                <a16:creationId xmlns:a16="http://schemas.microsoft.com/office/drawing/2014/main" id="{8ED9CF8D-3490-D848-5565-00A8A944D893}"/>
+          <p:cNvPr id="14" name="Picture 13">
+            <a:extLst>
+              <a:ext uri="{FF2B5EF4-FFF2-40B4-BE49-F238E27FC236}">
+                <a16:creationId xmlns:a16="http://schemas.microsoft.com/office/drawing/2014/main" id="{7D80687A-4839-19C1-3803-C14EA4407977}"/>
               </a:ext>
             </a:extLst>
           </p:cNvPr>
@@ -9713,14 +9879,13 @@
         </p:nvPicPr>
         <p:blipFill>
           <a:blip r:embed="rId2"/>
-          <a:stretch>
-            <a:fillRect/>
-          </a:stretch>
+          <a:srcRect t="4669" b="4669"/>
+          <a:stretch/>
         </p:blipFill>
         <p:spPr>
           <a:xfrm>
-            <a:off x="3803650" y="1206500"/>
-            <a:ext cx="4584700" cy="4445000"/>
+            <a:off x="2438400" y="1143000"/>
+            <a:ext cx="7315200" cy="4145098"/>
           </a:xfrm>
           <a:prstGeom prst="rect">
             <a:avLst/>
@@ -9729,10 +9894,100 @@
       </p:pic>
       <p:sp>
         <p:nvSpPr>
-          <p:cNvPr id="6" name="Right Bracket 5">
-            <a:extLst>
-              <a:ext uri="{FF2B5EF4-FFF2-40B4-BE49-F238E27FC236}">
-                <a16:creationId xmlns:a16="http://schemas.microsoft.com/office/drawing/2014/main" id="{AFB90344-70D4-1C8C-5156-61D1372C8051}"/>
+          <p:cNvPr id="10" name="TextBox 9">
+            <a:extLst>
+              <a:ext uri="{FF2B5EF4-FFF2-40B4-BE49-F238E27FC236}">
+                <a16:creationId xmlns:a16="http://schemas.microsoft.com/office/drawing/2014/main" id="{E8B2B7E8-0C8F-DC41-1B40-A090940DA6B9}"/>
+              </a:ext>
+            </a:extLst>
+          </p:cNvPr>
+          <p:cNvSpPr txBox="1"/>
+          <p:nvPr/>
+        </p:nvSpPr>
+        <p:spPr>
+          <a:xfrm>
+            <a:off x="8350787" y="1656052"/>
+            <a:ext cx="829935" cy="523220"/>
+          </a:xfrm>
+          <a:prstGeom prst="rect">
+            <a:avLst/>
+          </a:prstGeom>
+          <a:noFill/>
+        </p:spPr>
+        <p:txBody>
+          <a:bodyPr wrap="square" rtlCol="0">
+            <a:spAutoFit/>
+          </a:bodyPr>
+          <a:lstStyle/>
+          <a:p>
+            <a:r>
+              <a:rPr lang="en-US" sz="2800" dirty="0"/>
+              <a:t>N</a:t>
+            </a:r>
+            <a:r>
+              <a:rPr lang="en-US" sz="2800" baseline="-25000" dirty="0"/>
+              <a:t>1</a:t>
+            </a:r>
+          </a:p>
+        </p:txBody>
+      </p:sp>
+      <p:sp>
+        <p:nvSpPr>
+          <p:cNvPr id="11" name="TextBox 10">
+            <a:extLst>
+              <a:ext uri="{FF2B5EF4-FFF2-40B4-BE49-F238E27FC236}">
+                <a16:creationId xmlns:a16="http://schemas.microsoft.com/office/drawing/2014/main" id="{8651B827-A78B-FFB3-5DA3-AC59B6808ED0}"/>
+              </a:ext>
+            </a:extLst>
+          </p:cNvPr>
+          <p:cNvSpPr txBox="1"/>
+          <p:nvPr/>
+        </p:nvSpPr>
+        <p:spPr>
+          <a:xfrm>
+            <a:off x="4466431" y="3037679"/>
+            <a:ext cx="829935" cy="523220"/>
+          </a:xfrm>
+          <a:prstGeom prst="rect">
+            <a:avLst/>
+          </a:prstGeom>
+          <a:noFill/>
+        </p:spPr>
+        <p:txBody>
+          <a:bodyPr wrap="square" rtlCol="0">
+            <a:spAutoFit/>
+          </a:bodyPr>
+          <a:lstStyle/>
+          <a:p>
+            <a:r>
+              <a:rPr lang="en-US" sz="2800" dirty="0">
+                <a:solidFill>
+                  <a:schemeClr val="bg2">
+                    <a:lumMod val="50000"/>
+                  </a:schemeClr>
+                </a:solidFill>
+              </a:rPr>
+              <a:t>N</a:t>
+            </a:r>
+            <a:r>
+              <a:rPr lang="en-US" sz="2800" baseline="-25000" dirty="0">
+                <a:solidFill>
+                  <a:schemeClr val="bg2">
+                    <a:lumMod val="50000"/>
+                  </a:schemeClr>
+                </a:solidFill>
+              </a:rPr>
+              <a:t>2</a:t>
+            </a:r>
+          </a:p>
+        </p:txBody>
+      </p:sp>
+      <p:sp>
+        <p:nvSpPr>
+          <p:cNvPr id="16" name="Rectangle 15">
+            <a:extLst>
+              <a:ext uri="{FF2B5EF4-FFF2-40B4-BE49-F238E27FC236}">
+                <a16:creationId xmlns:a16="http://schemas.microsoft.com/office/drawing/2014/main" id="{E6EBB173-A33B-B658-10E6-B6E0401D0D6F}"/>
               </a:ext>
             </a:extLst>
           </p:cNvPr>
@@ -9740,13 +9995,99 @@
           <p:nvPr/>
         </p:nvSpPr>
         <p:spPr>
-          <a:xfrm rot="5400000">
-            <a:off x="5812968" y="3331028"/>
-            <a:ext cx="87272" cy="2237923"/>
-          </a:xfrm>
-          <a:prstGeom prst="rightBracket">
-            <a:avLst/>
-          </a:prstGeom>
+          <a:xfrm>
+            <a:off x="5053073" y="4881851"/>
+            <a:ext cx="2603649" cy="385592"/>
+          </a:xfrm>
+          <a:prstGeom prst="rect">
+            <a:avLst/>
+          </a:prstGeom>
+          <a:solidFill>
+            <a:schemeClr val="bg1"/>
+          </a:solidFill>
+          <a:ln>
+            <a:noFill/>
+          </a:ln>
+        </p:spPr>
+        <p:style>
+          <a:lnRef idx="2">
+            <a:schemeClr val="accent1">
+              <a:shade val="15000"/>
+            </a:schemeClr>
+          </a:lnRef>
+          <a:fillRef idx="1">
+            <a:schemeClr val="accent1"/>
+          </a:fillRef>
+          <a:effectRef idx="0">
+            <a:schemeClr val="accent1"/>
+          </a:effectRef>
+          <a:fontRef idx="minor">
+            <a:schemeClr val="lt1"/>
+          </a:fontRef>
+        </p:style>
+        <p:txBody>
+          <a:bodyPr rtlCol="0" anchor="ctr"/>
+          <a:lstStyle/>
+          <a:p>
+            <a:pPr algn="ctr"/>
+            <a:endParaRPr lang="en-US"/>
+          </a:p>
+        </p:txBody>
+      </p:sp>
+      <p:pic>
+        <p:nvPicPr>
+          <p:cNvPr id="17" name="Picture 16">
+            <a:extLst>
+              <a:ext uri="{FF2B5EF4-FFF2-40B4-BE49-F238E27FC236}">
+                <a16:creationId xmlns:a16="http://schemas.microsoft.com/office/drawing/2014/main" id="{A182D204-80EF-DE79-0F14-B3595F985984}"/>
+              </a:ext>
+            </a:extLst>
+          </p:cNvPr>
+          <p:cNvPicPr>
+            <a:picLocks noChangeAspect="1"/>
+          </p:cNvPicPr>
+          <p:nvPr/>
+        </p:nvPicPr>
+        <p:blipFill>
+          <a:blip r:embed="rId3"/>
+          <a:srcRect l="33108" t="86836" r="27586" b="4729"/>
+          <a:stretch/>
+        </p:blipFill>
+        <p:spPr>
+          <a:xfrm>
+            <a:off x="4909393" y="5655784"/>
+            <a:ext cx="2875402" cy="385592"/>
+          </a:xfrm>
+          <a:prstGeom prst="rect">
+            <a:avLst/>
+          </a:prstGeom>
+        </p:spPr>
+      </p:pic>
+      <p:cxnSp>
+        <p:nvCxnSpPr>
+          <p:cNvPr id="2" name="Straight Connector 1">
+            <a:extLst>
+              <a:ext uri="{FF2B5EF4-FFF2-40B4-BE49-F238E27FC236}">
+                <a16:creationId xmlns:a16="http://schemas.microsoft.com/office/drawing/2014/main" id="{196F6096-A73B-258C-8677-90A93B9010E5}"/>
+              </a:ext>
+            </a:extLst>
+          </p:cNvPr>
+          <p:cNvCxnSpPr/>
+          <p:nvPr/>
+        </p:nvCxnSpPr>
+        <p:spPr>
+          <a:xfrm>
+            <a:off x="3711763" y="4678728"/>
+            <a:ext cx="1" cy="203123"/>
+          </a:xfrm>
+          <a:prstGeom prst="line">
+            <a:avLst/>
+          </a:prstGeom>
+          <a:ln w="38100">
+            <a:solidFill>
+              <a:schemeClr val="tx1"/>
+            </a:solidFill>
+          </a:ln>
         </p:spPr>
         <p:style>
           <a:lnRef idx="2">
@@ -9762,21 +10103,13 @@
             <a:schemeClr val="tx1"/>
           </a:fontRef>
         </p:style>
-        <p:txBody>
-          <a:bodyPr rtlCol="0" anchor="ctr"/>
-          <a:lstStyle/>
-          <a:p>
-            <a:pPr algn="ctr"/>
-            <a:endParaRPr lang="en-US"/>
-          </a:p>
-        </p:txBody>
-      </p:sp>
-      <p:sp>
-        <p:nvSpPr>
-          <p:cNvPr id="7" name="TextBox 6">
-            <a:extLst>
-              <a:ext uri="{FF2B5EF4-FFF2-40B4-BE49-F238E27FC236}">
-                <a16:creationId xmlns:a16="http://schemas.microsoft.com/office/drawing/2014/main" id="{18CDF3CB-E568-DE7A-E130-893CBF13AF6E}"/>
+      </p:cxnSp>
+      <p:sp>
+        <p:nvSpPr>
+          <p:cNvPr id="3" name="TextBox 2">
+            <a:extLst>
+              <a:ext uri="{FF2B5EF4-FFF2-40B4-BE49-F238E27FC236}">
+                <a16:creationId xmlns:a16="http://schemas.microsoft.com/office/drawing/2014/main" id="{B2AF5465-14B2-1BED-571F-CF53B0B21DA6}"/>
               </a:ext>
             </a:extLst>
           </p:cNvPr>
@@ -9785,8 +10118,8 @@
         </p:nvSpPr>
         <p:spPr>
           <a:xfrm>
-            <a:off x="4842145" y="4493626"/>
-            <a:ext cx="2237924" cy="369332"/>
+            <a:off x="5048026" y="4929094"/>
+            <a:ext cx="2783590" cy="369332"/>
           </a:xfrm>
           <a:prstGeom prst="rect">
             <a:avLst/>
@@ -9799,48 +10132,181 @@
           </a:bodyPr>
           <a:lstStyle/>
           <a:p>
+            <a:pPr algn="ctr"/>
             <a:r>
               <a:rPr lang="en-US" dirty="0"/>
-              <a:t>Exponential portion</a:t>
-            </a:r>
-          </a:p>
-        </p:txBody>
-      </p:sp>
-      <p:pic>
-        <p:nvPicPr>
-          <p:cNvPr id="8" name="Picture 7" descr="A black background with a black square&#10;&#10;AI-generated content may be incorrect.">
-            <a:extLst>
-              <a:ext uri="{FF2B5EF4-FFF2-40B4-BE49-F238E27FC236}">
-                <a16:creationId xmlns:a16="http://schemas.microsoft.com/office/drawing/2014/main" id="{F967945C-BA80-127E-32B7-71B935C306B9}"/>
-              </a:ext>
-            </a:extLst>
-          </p:cNvPr>
-          <p:cNvPicPr>
-            <a:picLocks noChangeAspect="1"/>
-          </p:cNvPicPr>
-          <p:nvPr/>
-        </p:nvPicPr>
-        <p:blipFill>
-          <a:blip r:embed="rId2">
-            <a:lum bright="70000" contrast="-70000"/>
-          </a:blip>
-          <a:srcRect l="69185" b="21347"/>
-          <a:stretch/>
-        </p:blipFill>
-        <p:spPr>
-          <a:xfrm>
-            <a:off x="6975566" y="1206500"/>
-            <a:ext cx="1412784" cy="3496129"/>
-          </a:xfrm>
-          <a:prstGeom prst="rect">
-            <a:avLst/>
-          </a:prstGeom>
-        </p:spPr>
-      </p:pic>
+              <a:t>No resource preference</a:t>
+            </a:r>
+            <a:endParaRPr lang="en-US" i="1" dirty="0"/>
+          </a:p>
+        </p:txBody>
+      </p:sp>
+      <p:sp>
+        <p:nvSpPr>
+          <p:cNvPr id="4" name="TextBox 3">
+            <a:extLst>
+              <a:ext uri="{FF2B5EF4-FFF2-40B4-BE49-F238E27FC236}">
+                <a16:creationId xmlns:a16="http://schemas.microsoft.com/office/drawing/2014/main" id="{D28F4936-9FB3-A465-0E6A-7CEC7E852010}"/>
+              </a:ext>
+            </a:extLst>
+          </p:cNvPr>
+          <p:cNvSpPr txBox="1"/>
+          <p:nvPr/>
+        </p:nvSpPr>
+        <p:spPr>
+          <a:xfrm>
+            <a:off x="2962617" y="4895590"/>
+            <a:ext cx="1566239" cy="923330"/>
+          </a:xfrm>
+          <a:prstGeom prst="rect">
+            <a:avLst/>
+          </a:prstGeom>
+          <a:noFill/>
+        </p:spPr>
+        <p:txBody>
+          <a:bodyPr wrap="square" rtlCol="0">
+            <a:spAutoFit/>
+          </a:bodyPr>
+          <a:lstStyle/>
+          <a:p>
+            <a:pPr algn="ctr"/>
+            <a:r>
+              <a:rPr lang="en-US" dirty="0"/>
+              <a:t>100% specialization on resource</a:t>
+            </a:r>
+            <a:r>
+              <a:rPr lang="en-US" i="1" dirty="0"/>
+              <a:t> a</a:t>
+            </a:r>
+          </a:p>
+        </p:txBody>
+      </p:sp>
+      <p:cxnSp>
+        <p:nvCxnSpPr>
+          <p:cNvPr id="5" name="Straight Connector 4">
+            <a:extLst>
+              <a:ext uri="{FF2B5EF4-FFF2-40B4-BE49-F238E27FC236}">
+                <a16:creationId xmlns:a16="http://schemas.microsoft.com/office/drawing/2014/main" id="{B64B0031-7B84-C754-F2DB-1F1E083603C0}"/>
+              </a:ext>
+            </a:extLst>
+          </p:cNvPr>
+          <p:cNvCxnSpPr/>
+          <p:nvPr/>
+        </p:nvCxnSpPr>
+        <p:spPr>
+          <a:xfrm>
+            <a:off x="9099933" y="4678728"/>
+            <a:ext cx="1" cy="203123"/>
+          </a:xfrm>
+          <a:prstGeom prst="line">
+            <a:avLst/>
+          </a:prstGeom>
+          <a:ln w="38100">
+            <a:solidFill>
+              <a:schemeClr val="tx1"/>
+            </a:solidFill>
+          </a:ln>
+        </p:spPr>
+        <p:style>
+          <a:lnRef idx="2">
+            <a:schemeClr val="accent1"/>
+          </a:lnRef>
+          <a:fillRef idx="0">
+            <a:schemeClr val="accent1"/>
+          </a:fillRef>
+          <a:effectRef idx="1">
+            <a:schemeClr val="accent1"/>
+          </a:effectRef>
+          <a:fontRef idx="minor">
+            <a:schemeClr val="tx1"/>
+          </a:fontRef>
+        </p:style>
+      </p:cxnSp>
+      <p:sp>
+        <p:nvSpPr>
+          <p:cNvPr id="6" name="TextBox 5">
+            <a:extLst>
+              <a:ext uri="{FF2B5EF4-FFF2-40B4-BE49-F238E27FC236}">
+                <a16:creationId xmlns:a16="http://schemas.microsoft.com/office/drawing/2014/main" id="{94E6FF0C-2484-60C9-9D52-6C0C50F47AFF}"/>
+              </a:ext>
+            </a:extLst>
+          </p:cNvPr>
+          <p:cNvSpPr txBox="1"/>
+          <p:nvPr/>
+        </p:nvSpPr>
+        <p:spPr>
+          <a:xfrm>
+            <a:off x="8350787" y="4895590"/>
+            <a:ext cx="1566239" cy="923330"/>
+          </a:xfrm>
+          <a:prstGeom prst="rect">
+            <a:avLst/>
+          </a:prstGeom>
+          <a:noFill/>
+        </p:spPr>
+        <p:txBody>
+          <a:bodyPr wrap="square" rtlCol="0">
+            <a:spAutoFit/>
+          </a:bodyPr>
+          <a:lstStyle/>
+          <a:p>
+            <a:pPr algn="ctr"/>
+            <a:r>
+              <a:rPr lang="en-US" dirty="0"/>
+              <a:t>100% specialization on resource</a:t>
+            </a:r>
+            <a:r>
+              <a:rPr lang="en-US" i="1" dirty="0"/>
+              <a:t> b</a:t>
+            </a:r>
+          </a:p>
+        </p:txBody>
+      </p:sp>
+      <p:cxnSp>
+        <p:nvCxnSpPr>
+          <p:cNvPr id="7" name="Straight Connector 6">
+            <a:extLst>
+              <a:ext uri="{FF2B5EF4-FFF2-40B4-BE49-F238E27FC236}">
+                <a16:creationId xmlns:a16="http://schemas.microsoft.com/office/drawing/2014/main" id="{9FC53212-7D0C-5EAE-43B0-7779F69B4513}"/>
+              </a:ext>
+            </a:extLst>
+          </p:cNvPr>
+          <p:cNvCxnSpPr/>
+          <p:nvPr/>
+        </p:nvCxnSpPr>
+        <p:spPr>
+          <a:xfrm>
+            <a:off x="6347094" y="4678653"/>
+            <a:ext cx="1" cy="203123"/>
+          </a:xfrm>
+          <a:prstGeom prst="line">
+            <a:avLst/>
+          </a:prstGeom>
+          <a:ln w="38100">
+            <a:solidFill>
+              <a:schemeClr val="tx1"/>
+            </a:solidFill>
+          </a:ln>
+        </p:spPr>
+        <p:style>
+          <a:lnRef idx="2">
+            <a:schemeClr val="accent1"/>
+          </a:lnRef>
+          <a:fillRef idx="0">
+            <a:schemeClr val="accent1"/>
+          </a:fillRef>
+          <a:effectRef idx="1">
+            <a:schemeClr val="accent1"/>
+          </a:effectRef>
+          <a:fontRef idx="minor">
+            <a:schemeClr val="tx1"/>
+          </a:fontRef>
+        </p:style>
+      </p:cxnSp>
     </p:spTree>
     <p:extLst>
       <p:ext uri="{BB962C8B-B14F-4D97-AF65-F5344CB8AC3E}">
-        <p14:creationId xmlns:p14="http://schemas.microsoft.com/office/powerpoint/2010/main" val="4128152304"/>
+        <p14:creationId xmlns:p14="http://schemas.microsoft.com/office/powerpoint/2010/main" val="1228688644"/>
       </p:ext>
     </p:extLst>
   </p:cSld>

</xml_diff>